<commit_message>
final state for the project
</commit_message>
<xml_diff>
--- a/comp_project/Final_Presentation.pptx
+++ b/comp_project/Final_Presentation.pptx
@@ -4,16 +4,23 @@
   <p:sldMasterIdLst>
     <p:sldMasterId id="2147483648" r:id="rId1"/>
   </p:sldMasterIdLst>
+  <p:notesMasterIdLst>
+    <p:notesMasterId r:id="rId15"/>
+  </p:notesMasterIdLst>
   <p:sldIdLst>
     <p:sldId id="256" r:id="rId2"/>
     <p:sldId id="258" r:id="rId3"/>
     <p:sldId id="259" r:id="rId4"/>
     <p:sldId id="260" r:id="rId5"/>
     <p:sldId id="261" r:id="rId6"/>
-    <p:sldId id="262" r:id="rId7"/>
-    <p:sldId id="257" r:id="rId8"/>
-    <p:sldId id="263" r:id="rId9"/>
+    <p:sldId id="269" r:id="rId7"/>
+    <p:sldId id="262" r:id="rId8"/>
+    <p:sldId id="257" r:id="rId9"/>
     <p:sldId id="264" r:id="rId10"/>
+    <p:sldId id="263" r:id="rId11"/>
+    <p:sldId id="266" r:id="rId12"/>
+    <p:sldId id="267" r:id="rId13"/>
+    <p:sldId id="268" r:id="rId14"/>
   </p:sldIdLst>
   <p:sldSz cx="12192000" cy="6858000"/>
   <p:notesSz cx="6858000" cy="9144000"/>
@@ -113,6 +120,439 @@
     </a:lvl9pPr>
   </p:defaultTextStyle>
 </p:presentation>
+</file>
+
+<file path=ppt/notesMasters/notesMaster1.xml><?xml version="1.0" encoding="utf-8"?>
+<p:notesMaster xmlns:a="http://schemas.openxmlformats.org/drawingml/2006/main" xmlns:r="http://schemas.openxmlformats.org/officeDocument/2006/relationships" xmlns:p="http://schemas.openxmlformats.org/presentationml/2006/main">
+  <p:cSld>
+    <p:bg>
+      <p:bgRef idx="1001">
+        <a:schemeClr val="bg1"/>
+      </p:bgRef>
+    </p:bg>
+    <p:spTree>
+      <p:nvGrpSpPr>
+        <p:cNvPr id="1" name=""/>
+        <p:cNvGrpSpPr/>
+        <p:nvPr/>
+      </p:nvGrpSpPr>
+      <p:grpSpPr>
+        <a:xfrm>
+          <a:off x="0" y="0"/>
+          <a:ext cx="0" cy="0"/>
+          <a:chOff x="0" y="0"/>
+          <a:chExt cx="0" cy="0"/>
+        </a:xfrm>
+      </p:grpSpPr>
+      <p:sp>
+        <p:nvSpPr>
+          <p:cNvPr id="2" name="Header Placeholder 1"/>
+          <p:cNvSpPr>
+            <a:spLocks noGrp="1"/>
+          </p:cNvSpPr>
+          <p:nvPr>
+            <p:ph type="hdr" sz="quarter"/>
+          </p:nvPr>
+        </p:nvSpPr>
+        <p:spPr>
+          <a:xfrm>
+            <a:off x="0" y="0"/>
+            <a:ext cx="2971800" cy="458788"/>
+          </a:xfrm>
+          <a:prstGeom prst="rect">
+            <a:avLst/>
+          </a:prstGeom>
+        </p:spPr>
+        <p:txBody>
+          <a:bodyPr vert="horz" lIns="91440" tIns="45720" rIns="91440" bIns="45720" rtlCol="0"/>
+          <a:lstStyle>
+            <a:lvl1pPr algn="l">
+              <a:defRPr sz="1200"/>
+            </a:lvl1pPr>
+          </a:lstStyle>
+          <a:p>
+            <a:endParaRPr lang="en-US"/>
+          </a:p>
+        </p:txBody>
+      </p:sp>
+      <p:sp>
+        <p:nvSpPr>
+          <p:cNvPr id="3" name="Date Placeholder 2"/>
+          <p:cNvSpPr>
+            <a:spLocks noGrp="1"/>
+          </p:cNvSpPr>
+          <p:nvPr>
+            <p:ph type="dt" idx="1"/>
+          </p:nvPr>
+        </p:nvSpPr>
+        <p:spPr>
+          <a:xfrm>
+            <a:off x="3884613" y="0"/>
+            <a:ext cx="2971800" cy="458788"/>
+          </a:xfrm>
+          <a:prstGeom prst="rect">
+            <a:avLst/>
+          </a:prstGeom>
+        </p:spPr>
+        <p:txBody>
+          <a:bodyPr vert="horz" lIns="91440" tIns="45720" rIns="91440" bIns="45720" rtlCol="0"/>
+          <a:lstStyle>
+            <a:lvl1pPr algn="r">
+              <a:defRPr sz="1200"/>
+            </a:lvl1pPr>
+          </a:lstStyle>
+          <a:p>
+            <a:fld id="{8265F578-96B0-E040-81D9-2C89AA000EC6}" type="datetimeFigureOut">
+              <a:rPr lang="en-US" smtClean="0"/>
+              <a:t>12/8/22</a:t>
+            </a:fld>
+            <a:endParaRPr lang="en-US"/>
+          </a:p>
+        </p:txBody>
+      </p:sp>
+      <p:sp>
+        <p:nvSpPr>
+          <p:cNvPr id="4" name="Slide Image Placeholder 3"/>
+          <p:cNvSpPr>
+            <a:spLocks noGrp="1" noRot="1" noChangeAspect="1"/>
+          </p:cNvSpPr>
+          <p:nvPr>
+            <p:ph type="sldImg" idx="2"/>
+          </p:nvPr>
+        </p:nvSpPr>
+        <p:spPr>
+          <a:xfrm>
+            <a:off x="685800" y="1143000"/>
+            <a:ext cx="5486400" cy="3086100"/>
+          </a:xfrm>
+          <a:prstGeom prst="rect">
+            <a:avLst/>
+          </a:prstGeom>
+          <a:noFill/>
+          <a:ln w="12700">
+            <a:solidFill>
+              <a:prstClr val="black"/>
+            </a:solidFill>
+          </a:ln>
+        </p:spPr>
+        <p:txBody>
+          <a:bodyPr vert="horz" lIns="91440" tIns="45720" rIns="91440" bIns="45720" rtlCol="0" anchor="ctr"/>
+          <a:lstStyle/>
+          <a:p>
+            <a:endParaRPr lang="en-US"/>
+          </a:p>
+        </p:txBody>
+      </p:sp>
+      <p:sp>
+        <p:nvSpPr>
+          <p:cNvPr id="5" name="Notes Placeholder 4"/>
+          <p:cNvSpPr>
+            <a:spLocks noGrp="1"/>
+          </p:cNvSpPr>
+          <p:nvPr>
+            <p:ph type="body" sz="quarter" idx="3"/>
+          </p:nvPr>
+        </p:nvSpPr>
+        <p:spPr>
+          <a:xfrm>
+            <a:off x="685800" y="4400550"/>
+            <a:ext cx="5486400" cy="3600450"/>
+          </a:xfrm>
+          <a:prstGeom prst="rect">
+            <a:avLst/>
+          </a:prstGeom>
+        </p:spPr>
+        <p:txBody>
+          <a:bodyPr vert="horz" lIns="91440" tIns="45720" rIns="91440" bIns="45720" rtlCol="0"/>
+          <a:lstStyle/>
+          <a:p>
+            <a:pPr lvl="0"/>
+            <a:r>
+              <a:rPr lang="en-US"/>
+              <a:t>Click to edit Master text styles</a:t>
+            </a:r>
+          </a:p>
+          <a:p>
+            <a:pPr lvl="1"/>
+            <a:r>
+              <a:rPr lang="en-US"/>
+              <a:t>Second level</a:t>
+            </a:r>
+          </a:p>
+          <a:p>
+            <a:pPr lvl="2"/>
+            <a:r>
+              <a:rPr lang="en-US"/>
+              <a:t>Third level</a:t>
+            </a:r>
+          </a:p>
+          <a:p>
+            <a:pPr lvl="3"/>
+            <a:r>
+              <a:rPr lang="en-US"/>
+              <a:t>Fourth level</a:t>
+            </a:r>
+          </a:p>
+          <a:p>
+            <a:pPr lvl="4"/>
+            <a:r>
+              <a:rPr lang="en-US"/>
+              <a:t>Fifth level</a:t>
+            </a:r>
+          </a:p>
+        </p:txBody>
+      </p:sp>
+      <p:sp>
+        <p:nvSpPr>
+          <p:cNvPr id="6" name="Footer Placeholder 5"/>
+          <p:cNvSpPr>
+            <a:spLocks noGrp="1"/>
+          </p:cNvSpPr>
+          <p:nvPr>
+            <p:ph type="ftr" sz="quarter" idx="4"/>
+          </p:nvPr>
+        </p:nvSpPr>
+        <p:spPr>
+          <a:xfrm>
+            <a:off x="0" y="8685213"/>
+            <a:ext cx="2971800" cy="458787"/>
+          </a:xfrm>
+          <a:prstGeom prst="rect">
+            <a:avLst/>
+          </a:prstGeom>
+        </p:spPr>
+        <p:txBody>
+          <a:bodyPr vert="horz" lIns="91440" tIns="45720" rIns="91440" bIns="45720" rtlCol="0" anchor="b"/>
+          <a:lstStyle>
+            <a:lvl1pPr algn="l">
+              <a:defRPr sz="1200"/>
+            </a:lvl1pPr>
+          </a:lstStyle>
+          <a:p>
+            <a:endParaRPr lang="en-US"/>
+          </a:p>
+        </p:txBody>
+      </p:sp>
+      <p:sp>
+        <p:nvSpPr>
+          <p:cNvPr id="7" name="Slide Number Placeholder 6"/>
+          <p:cNvSpPr>
+            <a:spLocks noGrp="1"/>
+          </p:cNvSpPr>
+          <p:nvPr>
+            <p:ph type="sldNum" sz="quarter" idx="5"/>
+          </p:nvPr>
+        </p:nvSpPr>
+        <p:spPr>
+          <a:xfrm>
+            <a:off x="3884613" y="8685213"/>
+            <a:ext cx="2971800" cy="458787"/>
+          </a:xfrm>
+          <a:prstGeom prst="rect">
+            <a:avLst/>
+          </a:prstGeom>
+        </p:spPr>
+        <p:txBody>
+          <a:bodyPr vert="horz" lIns="91440" tIns="45720" rIns="91440" bIns="45720" rtlCol="0" anchor="b"/>
+          <a:lstStyle>
+            <a:lvl1pPr algn="r">
+              <a:defRPr sz="1200"/>
+            </a:lvl1pPr>
+          </a:lstStyle>
+          <a:p>
+            <a:fld id="{CB310E2F-0A33-5B46-984E-106D7881A2CD}" type="slidenum">
+              <a:rPr lang="en-US" smtClean="0"/>
+              <a:t>‹#›</a:t>
+            </a:fld>
+            <a:endParaRPr lang="en-US"/>
+          </a:p>
+        </p:txBody>
+      </p:sp>
+    </p:spTree>
+    <p:extLst>
+      <p:ext uri="{BB962C8B-B14F-4D97-AF65-F5344CB8AC3E}">
+        <p14:creationId xmlns:p14="http://schemas.microsoft.com/office/powerpoint/2010/main" val="2331571642"/>
+      </p:ext>
+    </p:extLst>
+  </p:cSld>
+  <p:clrMap bg1="lt1" tx1="dk1" bg2="lt2" tx2="dk2" accent1="accent1" accent2="accent2" accent3="accent3" accent4="accent4" accent5="accent5" accent6="accent6" hlink="hlink" folHlink="folHlink"/>
+  <p:notesStyle>
+    <a:lvl1pPr marL="0" algn="l" defTabSz="914400" rtl="0" eaLnBrk="1" latinLnBrk="0" hangingPunct="1">
+      <a:defRPr sz="1200" kern="1200">
+        <a:solidFill>
+          <a:schemeClr val="tx1"/>
+        </a:solidFill>
+        <a:latin typeface="+mn-lt"/>
+        <a:ea typeface="+mn-ea"/>
+        <a:cs typeface="+mn-cs"/>
+      </a:defRPr>
+    </a:lvl1pPr>
+    <a:lvl2pPr marL="457200" algn="l" defTabSz="914400" rtl="0" eaLnBrk="1" latinLnBrk="0" hangingPunct="1">
+      <a:defRPr sz="1200" kern="1200">
+        <a:solidFill>
+          <a:schemeClr val="tx1"/>
+        </a:solidFill>
+        <a:latin typeface="+mn-lt"/>
+        <a:ea typeface="+mn-ea"/>
+        <a:cs typeface="+mn-cs"/>
+      </a:defRPr>
+    </a:lvl2pPr>
+    <a:lvl3pPr marL="914400" algn="l" defTabSz="914400" rtl="0" eaLnBrk="1" latinLnBrk="0" hangingPunct="1">
+      <a:defRPr sz="1200" kern="1200">
+        <a:solidFill>
+          <a:schemeClr val="tx1"/>
+        </a:solidFill>
+        <a:latin typeface="+mn-lt"/>
+        <a:ea typeface="+mn-ea"/>
+        <a:cs typeface="+mn-cs"/>
+      </a:defRPr>
+    </a:lvl3pPr>
+    <a:lvl4pPr marL="1371600" algn="l" defTabSz="914400" rtl="0" eaLnBrk="1" latinLnBrk="0" hangingPunct="1">
+      <a:defRPr sz="1200" kern="1200">
+        <a:solidFill>
+          <a:schemeClr val="tx1"/>
+        </a:solidFill>
+        <a:latin typeface="+mn-lt"/>
+        <a:ea typeface="+mn-ea"/>
+        <a:cs typeface="+mn-cs"/>
+      </a:defRPr>
+    </a:lvl4pPr>
+    <a:lvl5pPr marL="1828800" algn="l" defTabSz="914400" rtl="0" eaLnBrk="1" latinLnBrk="0" hangingPunct="1">
+      <a:defRPr sz="1200" kern="1200">
+        <a:solidFill>
+          <a:schemeClr val="tx1"/>
+        </a:solidFill>
+        <a:latin typeface="+mn-lt"/>
+        <a:ea typeface="+mn-ea"/>
+        <a:cs typeface="+mn-cs"/>
+      </a:defRPr>
+    </a:lvl5pPr>
+    <a:lvl6pPr marL="2286000" algn="l" defTabSz="914400" rtl="0" eaLnBrk="1" latinLnBrk="0" hangingPunct="1">
+      <a:defRPr sz="1200" kern="1200">
+        <a:solidFill>
+          <a:schemeClr val="tx1"/>
+        </a:solidFill>
+        <a:latin typeface="+mn-lt"/>
+        <a:ea typeface="+mn-ea"/>
+        <a:cs typeface="+mn-cs"/>
+      </a:defRPr>
+    </a:lvl6pPr>
+    <a:lvl7pPr marL="2743200" algn="l" defTabSz="914400" rtl="0" eaLnBrk="1" latinLnBrk="0" hangingPunct="1">
+      <a:defRPr sz="1200" kern="1200">
+        <a:solidFill>
+          <a:schemeClr val="tx1"/>
+        </a:solidFill>
+        <a:latin typeface="+mn-lt"/>
+        <a:ea typeface="+mn-ea"/>
+        <a:cs typeface="+mn-cs"/>
+      </a:defRPr>
+    </a:lvl7pPr>
+    <a:lvl8pPr marL="3200400" algn="l" defTabSz="914400" rtl="0" eaLnBrk="1" latinLnBrk="0" hangingPunct="1">
+      <a:defRPr sz="1200" kern="1200">
+        <a:solidFill>
+          <a:schemeClr val="tx1"/>
+        </a:solidFill>
+        <a:latin typeface="+mn-lt"/>
+        <a:ea typeface="+mn-ea"/>
+        <a:cs typeface="+mn-cs"/>
+      </a:defRPr>
+    </a:lvl8pPr>
+    <a:lvl9pPr marL="3657600" algn="l" defTabSz="914400" rtl="0" eaLnBrk="1" latinLnBrk="0" hangingPunct="1">
+      <a:defRPr sz="1200" kern="1200">
+        <a:solidFill>
+          <a:schemeClr val="tx1"/>
+        </a:solidFill>
+        <a:latin typeface="+mn-lt"/>
+        <a:ea typeface="+mn-ea"/>
+        <a:cs typeface="+mn-cs"/>
+      </a:defRPr>
+    </a:lvl9pPr>
+  </p:notesStyle>
+</p:notesMaster>
+</file>
+
+<file path=ppt/notesSlides/notesSlide1.xml><?xml version="1.0" encoding="utf-8"?>
+<p:notes xmlns:a="http://schemas.openxmlformats.org/drawingml/2006/main" xmlns:r="http://schemas.openxmlformats.org/officeDocument/2006/relationships" xmlns:p="http://schemas.openxmlformats.org/presentationml/2006/main">
+  <p:cSld>
+    <p:spTree>
+      <p:nvGrpSpPr>
+        <p:cNvPr id="1" name=""/>
+        <p:cNvGrpSpPr/>
+        <p:nvPr/>
+      </p:nvGrpSpPr>
+      <p:grpSpPr>
+        <a:xfrm>
+          <a:off x="0" y="0"/>
+          <a:ext cx="0" cy="0"/>
+          <a:chOff x="0" y="0"/>
+          <a:chExt cx="0" cy="0"/>
+        </a:xfrm>
+      </p:grpSpPr>
+      <p:sp>
+        <p:nvSpPr>
+          <p:cNvPr id="2" name="Slide Image Placeholder 1"/>
+          <p:cNvSpPr>
+            <a:spLocks noGrp="1" noRot="1" noChangeAspect="1"/>
+          </p:cNvSpPr>
+          <p:nvPr>
+            <p:ph type="sldImg"/>
+          </p:nvPr>
+        </p:nvSpPr>
+        <p:spPr/>
+      </p:sp>
+      <p:sp>
+        <p:nvSpPr>
+          <p:cNvPr id="3" name="Notes Placeholder 2"/>
+          <p:cNvSpPr>
+            <a:spLocks noGrp="1"/>
+          </p:cNvSpPr>
+          <p:nvPr>
+            <p:ph type="body" idx="1"/>
+          </p:nvPr>
+        </p:nvSpPr>
+        <p:spPr/>
+        <p:txBody>
+          <a:bodyPr/>
+          <a:lstStyle/>
+          <a:p>
+            <a:endParaRPr lang="en-US" dirty="0"/>
+          </a:p>
+        </p:txBody>
+      </p:sp>
+      <p:sp>
+        <p:nvSpPr>
+          <p:cNvPr id="4" name="Slide Number Placeholder 3"/>
+          <p:cNvSpPr>
+            <a:spLocks noGrp="1"/>
+          </p:cNvSpPr>
+          <p:nvPr>
+            <p:ph type="sldNum" sz="quarter" idx="5"/>
+          </p:nvPr>
+        </p:nvSpPr>
+        <p:spPr/>
+        <p:txBody>
+          <a:bodyPr/>
+          <a:lstStyle/>
+          <a:p>
+            <a:fld id="{CB310E2F-0A33-5B46-984E-106D7881A2CD}" type="slidenum">
+              <a:rPr lang="en-US" smtClean="0"/>
+              <a:t>9</a:t>
+            </a:fld>
+            <a:endParaRPr lang="en-US"/>
+          </a:p>
+        </p:txBody>
+      </p:sp>
+    </p:spTree>
+    <p:extLst>
+      <p:ext uri="{BB962C8B-B14F-4D97-AF65-F5344CB8AC3E}">
+        <p14:creationId xmlns:p14="http://schemas.microsoft.com/office/powerpoint/2010/main" val="3426015437"/>
+      </p:ext>
+    </p:extLst>
+  </p:cSld>
+  <p:clrMapOvr>
+    <a:masterClrMapping/>
+  </p:clrMapOvr>
+</p:notes>
 </file>
 
 <file path=ppt/slideLayouts/slideLayout1.xml><?xml version="1.0" encoding="utf-8"?>
@@ -3409,7 +3849,7 @@
 </p:sld>
 </file>
 
-<file path=ppt/slides/slide2.xml><?xml version="1.0" encoding="utf-8"?>
+<file path=ppt/slides/slide10.xml><?xml version="1.0" encoding="utf-8"?>
 <p:sld xmlns:a="http://schemas.openxmlformats.org/drawingml/2006/main" xmlns:r="http://schemas.openxmlformats.org/officeDocument/2006/relationships" xmlns:p="http://schemas.openxmlformats.org/presentationml/2006/main">
   <p:cSld>
     <p:spTree>
@@ -3431,7 +3871,7 @@
           <p:cNvPr id="2" name="Title 1">
             <a:extLst>
               <a:ext uri="{FF2B5EF4-FFF2-40B4-BE49-F238E27FC236}">
-                <a16:creationId xmlns:a16="http://schemas.microsoft.com/office/drawing/2014/main" id="{390E3F3E-65B6-6240-03A8-CFC353ABC565}"/>
+                <a16:creationId xmlns:a16="http://schemas.microsoft.com/office/drawing/2014/main" id="{5E5BE2AE-2E10-F618-3140-5796F08DF3F8}"/>
               </a:ext>
             </a:extLst>
           </p:cNvPr>
@@ -3449,43 +3889,73 @@
           <a:p>
             <a:r>
               <a:rPr lang="en-US" dirty="0"/>
-              <a:t>Executive Summary</a:t>
-            </a:r>
-          </a:p>
-        </p:txBody>
-      </p:sp>
-      <p:sp>
-        <p:nvSpPr>
-          <p:cNvPr id="3" name="Content Placeholder 2">
-            <a:extLst>
-              <a:ext uri="{FF2B5EF4-FFF2-40B4-BE49-F238E27FC236}">
-                <a16:creationId xmlns:a16="http://schemas.microsoft.com/office/drawing/2014/main" id="{D842D623-2F0C-080A-2C6F-AE06FC124212}"/>
-              </a:ext>
-            </a:extLst>
-          </p:cNvPr>
-          <p:cNvSpPr>
-            <a:spLocks noGrp="1"/>
-          </p:cNvSpPr>
-          <p:nvPr>
-            <p:ph idx="1"/>
-          </p:nvPr>
-        </p:nvSpPr>
-        <p:spPr/>
-        <p:txBody>
-          <a:bodyPr/>
-          <a:lstStyle/>
-          <a:p>
-            <a:r>
-              <a:rPr lang="en-US" dirty="0"/>
-              <a:t>Running </a:t>
-            </a:r>
-          </a:p>
-        </p:txBody>
-      </p:sp>
+              <a:t>Data Before and After</a:t>
+            </a:r>
+          </a:p>
+        </p:txBody>
+      </p:sp>
+      <p:pic>
+        <p:nvPicPr>
+          <p:cNvPr id="7" name="Picture 6" descr="Chart, line chart&#10;&#10;Description automatically generated">
+            <a:extLst>
+              <a:ext uri="{FF2B5EF4-FFF2-40B4-BE49-F238E27FC236}">
+                <a16:creationId xmlns:a16="http://schemas.microsoft.com/office/drawing/2014/main" id="{89514D7D-A7B7-FEE3-DE63-7EE7ED43E17D}"/>
+              </a:ext>
+            </a:extLst>
+          </p:cNvPr>
+          <p:cNvPicPr>
+            <a:picLocks noChangeAspect="1"/>
+          </p:cNvPicPr>
+          <p:nvPr/>
+        </p:nvPicPr>
+        <p:blipFill rotWithShape="1">
+          <a:blip r:embed="rId2"/>
+          <a:srcRect l="9459" t="11660" r="12394" b="5381"/>
+          <a:stretch/>
+        </p:blipFill>
+        <p:spPr>
+          <a:xfrm>
+            <a:off x="5528789" y="3901685"/>
+            <a:ext cx="6073796" cy="2531253"/>
+          </a:xfrm>
+          <a:prstGeom prst="rect">
+            <a:avLst/>
+          </a:prstGeom>
+        </p:spPr>
+      </p:pic>
+      <p:pic>
+        <p:nvPicPr>
+          <p:cNvPr id="5" name="Picture 4" descr="A picture containing text&#10;&#10;Description automatically generated">
+            <a:extLst>
+              <a:ext uri="{FF2B5EF4-FFF2-40B4-BE49-F238E27FC236}">
+                <a16:creationId xmlns:a16="http://schemas.microsoft.com/office/drawing/2014/main" id="{2B4B2EFD-65C6-9BDA-ED70-657EAD8078A0}"/>
+              </a:ext>
+            </a:extLst>
+          </p:cNvPr>
+          <p:cNvPicPr>
+            <a:picLocks noChangeAspect="1"/>
+          </p:cNvPicPr>
+          <p:nvPr/>
+        </p:nvPicPr>
+        <p:blipFill rotWithShape="1">
+          <a:blip r:embed="rId3"/>
+          <a:srcRect l="10265" t="10306" r="11589" b="6734"/>
+          <a:stretch/>
+        </p:blipFill>
+        <p:spPr>
+          <a:xfrm>
+            <a:off x="419353" y="1690688"/>
+            <a:ext cx="6073796" cy="2531253"/>
+          </a:xfrm>
+          <a:prstGeom prst="rect">
+            <a:avLst/>
+          </a:prstGeom>
+        </p:spPr>
+      </p:pic>
     </p:spTree>
     <p:extLst>
       <p:ext uri="{BB962C8B-B14F-4D97-AF65-F5344CB8AC3E}">
-        <p14:creationId xmlns:p14="http://schemas.microsoft.com/office/powerpoint/2010/main" val="3962293737"/>
+        <p14:creationId xmlns:p14="http://schemas.microsoft.com/office/powerpoint/2010/main" val="1228097628"/>
       </p:ext>
     </p:extLst>
   </p:cSld>
@@ -3495,7 +3965,7 @@
 </p:sld>
 </file>
 
-<file path=ppt/slides/slide3.xml><?xml version="1.0" encoding="utf-8"?>
+<file path=ppt/slides/slide11.xml><?xml version="1.0" encoding="utf-8"?>
 <p:sld xmlns:a="http://schemas.openxmlformats.org/drawingml/2006/main" xmlns:r="http://schemas.openxmlformats.org/officeDocument/2006/relationships" xmlns:p="http://schemas.openxmlformats.org/presentationml/2006/main">
   <p:cSld>
     <p:spTree>
@@ -3517,7 +3987,7 @@
           <p:cNvPr id="2" name="Title 1">
             <a:extLst>
               <a:ext uri="{FF2B5EF4-FFF2-40B4-BE49-F238E27FC236}">
-                <a16:creationId xmlns:a16="http://schemas.microsoft.com/office/drawing/2014/main" id="{7F9883DD-99B1-EA75-F54B-0B3F7D35331E}"/>
+                <a16:creationId xmlns:a16="http://schemas.microsoft.com/office/drawing/2014/main" id="{3F1B53BF-64E2-01ED-7A1F-A68969C7EED7}"/>
               </a:ext>
             </a:extLst>
           </p:cNvPr>
@@ -3535,404 +4005,45 @@
           <a:p>
             <a:r>
               <a:rPr lang="en-US" dirty="0"/>
-              <a:t>Approach</a:t>
-            </a:r>
-          </a:p>
-        </p:txBody>
-      </p:sp>
-      <p:sp>
-        <p:nvSpPr>
-          <p:cNvPr id="3" name="Content Placeholder 2">
-            <a:extLst>
-              <a:ext uri="{FF2B5EF4-FFF2-40B4-BE49-F238E27FC236}">
-                <a16:creationId xmlns:a16="http://schemas.microsoft.com/office/drawing/2014/main" id="{81FB4B79-71EC-F7F5-F000-C5AAE2E189C1}"/>
-              </a:ext>
-            </a:extLst>
-          </p:cNvPr>
-          <p:cNvSpPr>
-            <a:spLocks noGrp="1"/>
-          </p:cNvSpPr>
+              <a:t>Prediction </a:t>
+            </a:r>
+          </a:p>
+        </p:txBody>
+      </p:sp>
+      <p:pic>
+        <p:nvPicPr>
+          <p:cNvPr id="5" name="Content Placeholder 4">
+            <a:extLst>
+              <a:ext uri="{FF2B5EF4-FFF2-40B4-BE49-F238E27FC236}">
+                <a16:creationId xmlns:a16="http://schemas.microsoft.com/office/drawing/2014/main" id="{5CF1DAEC-34EE-05A8-D927-552D40552EA2}"/>
+              </a:ext>
+            </a:extLst>
+          </p:cNvPr>
+          <p:cNvPicPr>
+            <a:picLocks noGrp="1" noChangeAspect="1"/>
+          </p:cNvPicPr>
           <p:nvPr>
             <p:ph idx="1"/>
           </p:nvPr>
-        </p:nvSpPr>
-        <p:spPr/>
-        <p:txBody>
-          <a:bodyPr/>
-          <a:lstStyle/>
-          <a:p>
-            <a:r>
-              <a:rPr lang="en-US" dirty="0"/>
-              <a:t>Data Source: Kaggle Bike Count Prediction Multivariate Data Set</a:t>
-            </a:r>
-          </a:p>
-          <a:p>
-            <a:pPr lvl="1"/>
-            <a:r>
-              <a:rPr lang="en-US" dirty="0"/>
-              <a:t>Included weather related features</a:t>
-            </a:r>
-          </a:p>
-          <a:p>
-            <a:r>
-              <a:rPr lang="en-US" dirty="0"/>
-              <a:t>Neural Network Forecaster: the Transformer model to predict bike rental demand</a:t>
-            </a:r>
-          </a:p>
-          <a:p>
-            <a:r>
-              <a:rPr lang="en-US" dirty="0"/>
-              <a:t>Examined the impact of non-time-series features on rental demand</a:t>
-            </a:r>
-          </a:p>
-          <a:p>
-            <a:r>
-              <a:rPr lang="en-US" dirty="0"/>
-              <a:t>Used Python and Darts to create model</a:t>
-            </a:r>
-          </a:p>
-          <a:p>
-            <a:endParaRPr lang="en-US" dirty="0"/>
-          </a:p>
-          <a:p>
-            <a:endParaRPr lang="en-US" dirty="0"/>
-          </a:p>
-        </p:txBody>
-      </p:sp>
-    </p:spTree>
-    <p:extLst>
-      <p:ext uri="{BB962C8B-B14F-4D97-AF65-F5344CB8AC3E}">
-        <p14:creationId xmlns:p14="http://schemas.microsoft.com/office/powerpoint/2010/main" val="254180623"/>
-      </p:ext>
-    </p:extLst>
-  </p:cSld>
-  <p:clrMapOvr>
-    <a:masterClrMapping/>
-  </p:clrMapOvr>
-</p:sld>
-</file>
-
-<file path=ppt/slides/slide4.xml><?xml version="1.0" encoding="utf-8"?>
-<p:sld xmlns:a="http://schemas.openxmlformats.org/drawingml/2006/main" xmlns:r="http://schemas.openxmlformats.org/officeDocument/2006/relationships" xmlns:p="http://schemas.openxmlformats.org/presentationml/2006/main">
-  <p:cSld>
-    <p:spTree>
-      <p:nvGrpSpPr>
-        <p:cNvPr id="1" name=""/>
-        <p:cNvGrpSpPr/>
-        <p:nvPr/>
-      </p:nvGrpSpPr>
-      <p:grpSpPr>
-        <a:xfrm>
-          <a:off x="0" y="0"/>
-          <a:ext cx="0" cy="0"/>
-          <a:chOff x="0" y="0"/>
-          <a:chExt cx="0" cy="0"/>
-        </a:xfrm>
-      </p:grpSpPr>
-      <p:sp>
-        <p:nvSpPr>
-          <p:cNvPr id="2" name="Title 1">
-            <a:extLst>
-              <a:ext uri="{FF2B5EF4-FFF2-40B4-BE49-F238E27FC236}">
-                <a16:creationId xmlns:a16="http://schemas.microsoft.com/office/drawing/2014/main" id="{F136F96A-F52F-4B7B-6419-7DB727E2B64A}"/>
-              </a:ext>
-            </a:extLst>
-          </p:cNvPr>
-          <p:cNvSpPr>
-            <a:spLocks noGrp="1"/>
-          </p:cNvSpPr>
-          <p:nvPr>
-            <p:ph type="title"/>
-          </p:nvPr>
-        </p:nvSpPr>
-        <p:spPr/>
-        <p:txBody>
-          <a:bodyPr/>
-          <a:lstStyle/>
-          <a:p>
-            <a:r>
-              <a:rPr lang="en-US" dirty="0"/>
-              <a:t>Model Description</a:t>
-            </a:r>
-          </a:p>
-        </p:txBody>
-      </p:sp>
-      <p:sp>
-        <p:nvSpPr>
-          <p:cNvPr id="3" name="Content Placeholder 2">
-            <a:extLst>
-              <a:ext uri="{FF2B5EF4-FFF2-40B4-BE49-F238E27FC236}">
-                <a16:creationId xmlns:a16="http://schemas.microsoft.com/office/drawing/2014/main" id="{9AFB72EB-C8FC-F8B8-BEFE-092B415F9F89}"/>
-              </a:ext>
-            </a:extLst>
-          </p:cNvPr>
-          <p:cNvSpPr>
-            <a:spLocks noGrp="1"/>
-          </p:cNvSpPr>
-          <p:nvPr>
-            <p:ph idx="1"/>
-          </p:nvPr>
-        </p:nvSpPr>
-        <p:spPr/>
-        <p:txBody>
-          <a:bodyPr>
-            <a:normAutofit fontScale="70000" lnSpcReduction="20000"/>
-          </a:bodyPr>
-          <a:lstStyle/>
-          <a:p>
-            <a:r>
-              <a:rPr lang="en-US" dirty="0"/>
-              <a:t>Overview of basic methodology: </a:t>
-            </a:r>
-          </a:p>
-          <a:p>
-            <a:r>
-              <a:rPr lang="en-US" dirty="0"/>
-              <a:t>Model: </a:t>
-            </a:r>
-            <a:r>
-              <a:rPr lang="en-US" dirty="0" err="1"/>
-              <a:t>TransformerModel</a:t>
-            </a:r>
-            <a:endParaRPr lang="en-US" dirty="0"/>
-          </a:p>
-          <a:p>
-            <a:r>
-              <a:rPr lang="en-US" dirty="0"/>
-              <a:t>Dependent variable: Bike rental count (daily)</a:t>
-            </a:r>
-          </a:p>
-          <a:p>
-            <a:r>
-              <a:rPr lang="en-US" dirty="0"/>
-              <a:t>Scope:</a:t>
-            </a:r>
-          </a:p>
-          <a:p>
-            <a:pPr lvl="1"/>
-            <a:r>
-              <a:rPr lang="en-US" dirty="0"/>
-              <a:t>Bike rental company in unknown city with over 4,500+ daily rides</a:t>
-            </a:r>
-          </a:p>
-          <a:p>
-            <a:r>
-              <a:rPr lang="en-US" dirty="0"/>
-              <a:t>Sampling</a:t>
-            </a:r>
-          </a:p>
-          <a:p>
-            <a:pPr lvl="1"/>
-            <a:r>
-              <a:rPr lang="en-US" dirty="0"/>
-              <a:t>training </a:t>
-            </a:r>
-          </a:p>
-          <a:p>
-            <a:pPr lvl="2"/>
-            <a:r>
-              <a:rPr lang="en-US" dirty="0"/>
-              <a:t>start: 2011-01-01</a:t>
-            </a:r>
-          </a:p>
-          <a:p>
-            <a:pPr lvl="2"/>
-            <a:r>
-              <a:rPr lang="en-US" dirty="0"/>
-              <a:t>end: 2012-08-21</a:t>
-            </a:r>
-          </a:p>
-          <a:p>
-            <a:pPr lvl="2"/>
-            <a:r>
-              <a:rPr lang="en-US" dirty="0"/>
-              <a:t>duration: 598 days </a:t>
-            </a:r>
-          </a:p>
-          <a:p>
-            <a:pPr lvl="1"/>
-            <a:r>
-              <a:rPr lang="en-US" dirty="0"/>
-              <a:t>test </a:t>
-            </a:r>
-          </a:p>
-          <a:p>
-            <a:pPr lvl="2"/>
-            <a:r>
-              <a:rPr lang="en-US" dirty="0"/>
-              <a:t>start: 2012-08-22 </a:t>
-            </a:r>
-          </a:p>
-          <a:p>
-            <a:pPr lvl="2"/>
-            <a:r>
-              <a:rPr lang="en-US" dirty="0"/>
-              <a:t>end: 2012-10-27 </a:t>
-            </a:r>
-          </a:p>
-          <a:p>
-            <a:pPr lvl="1"/>
-            <a:r>
-              <a:rPr lang="en-US" dirty="0"/>
-              <a:t>duration: 66 days</a:t>
-            </a:r>
-          </a:p>
-          <a:p>
-            <a:r>
-              <a:rPr lang="en-US" dirty="0"/>
-              <a:t>The model developed has the predictive power</a:t>
-            </a:r>
-          </a:p>
-        </p:txBody>
-      </p:sp>
-    </p:spTree>
-    <p:extLst>
-      <p:ext uri="{BB962C8B-B14F-4D97-AF65-F5344CB8AC3E}">
-        <p14:creationId xmlns:p14="http://schemas.microsoft.com/office/powerpoint/2010/main" val="2853737377"/>
-      </p:ext>
-    </p:extLst>
-  </p:cSld>
-  <p:clrMapOvr>
-    <a:masterClrMapping/>
-  </p:clrMapOvr>
-</p:sld>
-</file>
-
-<file path=ppt/slides/slide5.xml><?xml version="1.0" encoding="utf-8"?>
-<p:sld xmlns:a="http://schemas.openxmlformats.org/drawingml/2006/main" xmlns:r="http://schemas.openxmlformats.org/officeDocument/2006/relationships" xmlns:p="http://schemas.openxmlformats.org/presentationml/2006/main">
-  <p:cSld>
-    <p:spTree>
-      <p:nvGrpSpPr>
-        <p:cNvPr id="1" name=""/>
-        <p:cNvGrpSpPr/>
-        <p:nvPr/>
-      </p:nvGrpSpPr>
-      <p:grpSpPr>
-        <a:xfrm>
-          <a:off x="0" y="0"/>
-          <a:ext cx="0" cy="0"/>
-          <a:chOff x="0" y="0"/>
-          <a:chExt cx="0" cy="0"/>
-        </a:xfrm>
-      </p:grpSpPr>
-      <p:sp>
-        <p:nvSpPr>
-          <p:cNvPr id="2" name="Title 1">
-            <a:extLst>
-              <a:ext uri="{FF2B5EF4-FFF2-40B4-BE49-F238E27FC236}">
-                <a16:creationId xmlns:a16="http://schemas.microsoft.com/office/drawing/2014/main" id="{10A687C3-4208-600C-E6A0-DFAD23FBB251}"/>
-              </a:ext>
-            </a:extLst>
-          </p:cNvPr>
-          <p:cNvSpPr>
-            <a:spLocks noGrp="1"/>
-          </p:cNvSpPr>
-          <p:nvPr>
-            <p:ph type="title"/>
-          </p:nvPr>
-        </p:nvSpPr>
-        <p:spPr/>
-        <p:txBody>
-          <a:bodyPr/>
-          <a:lstStyle/>
-          <a:p>
-            <a:r>
-              <a:rPr lang="en-US" dirty="0"/>
-              <a:t>Model Details</a:t>
-            </a:r>
-          </a:p>
-        </p:txBody>
-      </p:sp>
-      <p:sp>
-        <p:nvSpPr>
-          <p:cNvPr id="3" name="Content Placeholder 2">
-            <a:extLst>
-              <a:ext uri="{FF2B5EF4-FFF2-40B4-BE49-F238E27FC236}">
-                <a16:creationId xmlns:a16="http://schemas.microsoft.com/office/drawing/2014/main" id="{EE70D1B5-1441-98AF-06E0-52ACEEF26DF1}"/>
-              </a:ext>
-            </a:extLst>
-          </p:cNvPr>
-          <p:cNvSpPr>
-            <a:spLocks noGrp="1"/>
-          </p:cNvSpPr>
-          <p:nvPr>
-            <p:ph idx="1"/>
-          </p:nvPr>
-        </p:nvSpPr>
+        </p:nvPicPr>
+        <p:blipFill rotWithShape="1">
+          <a:blip r:embed="rId2"/>
+          <a:srcRect l="9420" t="6944" r="8696" b="3438"/>
+          <a:stretch/>
+        </p:blipFill>
         <p:spPr>
           <a:xfrm>
-            <a:off x="838200" y="1825625"/>
-            <a:ext cx="5257800" cy="4351338"/>
+            <a:off x="1132114" y="1421265"/>
+            <a:ext cx="8610600" cy="3298372"/>
           </a:xfrm>
         </p:spPr>
-        <p:txBody>
-          <a:bodyPr>
-            <a:normAutofit fontScale="92500" lnSpcReduction="10000"/>
-          </a:bodyPr>
-          <a:lstStyle/>
-          <a:p>
-            <a:r>
-              <a:rPr lang="en-US" dirty="0"/>
-              <a:t>Candidate variables: </a:t>
-            </a:r>
-          </a:p>
-          <a:p>
-            <a:pPr lvl="1"/>
-            <a:r>
-              <a:rPr lang="en-US" dirty="0"/>
-              <a:t>season</a:t>
-            </a:r>
-          </a:p>
-          <a:p>
-            <a:pPr lvl="1"/>
-            <a:r>
-              <a:rPr lang="en-US" dirty="0"/>
-              <a:t>holiday
-working day
-weather
-temp
-</a:t>
-            </a:r>
-            <a:r>
-              <a:rPr lang="en-US" dirty="0" err="1"/>
-              <a:t>atemp</a:t>
-            </a:r>
-            <a:r>
-              <a:rPr lang="en-US" dirty="0"/>
-              <a:t>
-humidity
-wind speed</a:t>
-            </a:r>
-          </a:p>
-          <a:p>
-            <a:r>
-              <a:rPr lang="en-US" dirty="0"/>
-              <a:t>Feature selection</a:t>
-            </a:r>
-          </a:p>
-          <a:p>
-            <a:pPr lvl="1"/>
-            <a:r>
-              <a:rPr lang="en-US" dirty="0"/>
-              <a:t>Drop features based on correlation to </a:t>
-            </a:r>
-            <a:r>
-              <a:rPr lang="en-US"/>
-              <a:t>target feature</a:t>
-            </a:r>
-            <a:endParaRPr lang="en-US" dirty="0"/>
-          </a:p>
-          <a:p>
-            <a:endParaRPr lang="en-US" dirty="0"/>
-          </a:p>
-        </p:txBody>
-      </p:sp>
-      <p:sp>
-        <p:nvSpPr>
-          <p:cNvPr id="4" name="Content Placeholder 2">
-            <a:extLst>
-              <a:ext uri="{FF2B5EF4-FFF2-40B4-BE49-F238E27FC236}">
-                <a16:creationId xmlns:a16="http://schemas.microsoft.com/office/drawing/2014/main" id="{AA676938-4CAF-D316-A3EB-74DC4180FCF7}"/>
+      </p:pic>
+      <p:sp>
+        <p:nvSpPr>
+          <p:cNvPr id="7" name="Content Placeholder 2">
+            <a:extLst>
+              <a:ext uri="{FF2B5EF4-FFF2-40B4-BE49-F238E27FC236}">
+                <a16:creationId xmlns:a16="http://schemas.microsoft.com/office/drawing/2014/main" id="{FB9ADBB4-4447-BFB8-CDCC-2F8F89819B7B}"/>
               </a:ext>
             </a:extLst>
           </p:cNvPr>
@@ -3943,8 +4054,8 @@
         </p:nvSpPr>
         <p:spPr>
           <a:xfrm>
-            <a:off x="6096000" y="1825625"/>
-            <a:ext cx="5257800" cy="4351338"/>
+            <a:off x="838200" y="4746171"/>
+            <a:ext cx="10515600" cy="1430792"/>
           </a:xfrm>
           <a:prstGeom prst="rect">
             <a:avLst/>
@@ -4121,36 +4232,1053 @@
           <a:p>
             <a:r>
               <a:rPr lang="en-US" dirty="0"/>
+              <a:t>MAPE: 12.14</a:t>
+            </a:r>
+          </a:p>
+          <a:p>
+            <a:r>
+              <a:rPr lang="en-US" dirty="0"/>
+              <a:t>RSME: 1120.16</a:t>
+            </a:r>
+          </a:p>
+        </p:txBody>
+      </p:sp>
+    </p:spTree>
+    <p:extLst>
+      <p:ext uri="{BB962C8B-B14F-4D97-AF65-F5344CB8AC3E}">
+        <p14:creationId xmlns:p14="http://schemas.microsoft.com/office/powerpoint/2010/main" val="3490898424"/>
+      </p:ext>
+    </p:extLst>
+  </p:cSld>
+  <p:clrMapOvr>
+    <a:masterClrMapping/>
+  </p:clrMapOvr>
+</p:sld>
+</file>
+
+<file path=ppt/slides/slide12.xml><?xml version="1.0" encoding="utf-8"?>
+<p:sld xmlns:a="http://schemas.openxmlformats.org/drawingml/2006/main" xmlns:r="http://schemas.openxmlformats.org/officeDocument/2006/relationships" xmlns:p="http://schemas.openxmlformats.org/presentationml/2006/main">
+  <p:cSld>
+    <p:spTree>
+      <p:nvGrpSpPr>
+        <p:cNvPr id="1" name=""/>
+        <p:cNvGrpSpPr/>
+        <p:nvPr/>
+      </p:nvGrpSpPr>
+      <p:grpSpPr>
+        <a:xfrm>
+          <a:off x="0" y="0"/>
+          <a:ext cx="0" cy="0"/>
+          <a:chOff x="0" y="0"/>
+          <a:chExt cx="0" cy="0"/>
+        </a:xfrm>
+      </p:grpSpPr>
+      <p:sp>
+        <p:nvSpPr>
+          <p:cNvPr id="2" name="Title 1">
+            <a:extLst>
+              <a:ext uri="{FF2B5EF4-FFF2-40B4-BE49-F238E27FC236}">
+                <a16:creationId xmlns:a16="http://schemas.microsoft.com/office/drawing/2014/main" id="{0D3EB8C7-80C8-2BF2-D715-977B43F5A4DA}"/>
+              </a:ext>
+            </a:extLst>
+          </p:cNvPr>
+          <p:cNvSpPr>
+            <a:spLocks noGrp="1"/>
+          </p:cNvSpPr>
+          <p:nvPr>
+            <p:ph type="ctrTitle"/>
+          </p:nvPr>
+        </p:nvSpPr>
+        <p:spPr/>
+        <p:txBody>
+          <a:bodyPr/>
+          <a:lstStyle/>
+          <a:p>
+            <a:r>
+              <a:rPr lang="en-US" dirty="0"/>
+              <a:t>Thank you</a:t>
+            </a:r>
+          </a:p>
+        </p:txBody>
+      </p:sp>
+    </p:spTree>
+    <p:extLst>
+      <p:ext uri="{BB962C8B-B14F-4D97-AF65-F5344CB8AC3E}">
+        <p14:creationId xmlns:p14="http://schemas.microsoft.com/office/powerpoint/2010/main" val="2104894480"/>
+      </p:ext>
+    </p:extLst>
+  </p:cSld>
+  <p:clrMapOvr>
+    <a:masterClrMapping/>
+  </p:clrMapOvr>
+</p:sld>
+</file>
+
+<file path=ppt/slides/slide13.xml><?xml version="1.0" encoding="utf-8"?>
+<p:sld xmlns:a="http://schemas.openxmlformats.org/drawingml/2006/main" xmlns:r="http://schemas.openxmlformats.org/officeDocument/2006/relationships" xmlns:p="http://schemas.openxmlformats.org/presentationml/2006/main">
+  <p:cSld>
+    <p:spTree>
+      <p:nvGrpSpPr>
+        <p:cNvPr id="1" name=""/>
+        <p:cNvGrpSpPr/>
+        <p:nvPr/>
+      </p:nvGrpSpPr>
+      <p:grpSpPr>
+        <a:xfrm>
+          <a:off x="0" y="0"/>
+          <a:ext cx="0" cy="0"/>
+          <a:chOff x="0" y="0"/>
+          <a:chExt cx="0" cy="0"/>
+        </a:xfrm>
+      </p:grpSpPr>
+      <p:sp>
+        <p:nvSpPr>
+          <p:cNvPr id="2" name="Title 1">
+            <a:extLst>
+              <a:ext uri="{FF2B5EF4-FFF2-40B4-BE49-F238E27FC236}">
+                <a16:creationId xmlns:a16="http://schemas.microsoft.com/office/drawing/2014/main" id="{D743E5F6-9313-008A-5D2E-838549B55DFE}"/>
+              </a:ext>
+            </a:extLst>
+          </p:cNvPr>
+          <p:cNvSpPr>
+            <a:spLocks noGrp="1"/>
+          </p:cNvSpPr>
+          <p:nvPr>
+            <p:ph type="title"/>
+          </p:nvPr>
+        </p:nvSpPr>
+        <p:spPr/>
+        <p:txBody>
+          <a:bodyPr/>
+          <a:lstStyle/>
+          <a:p>
+            <a:r>
+              <a:rPr lang="en-US" dirty="0"/>
+              <a:t>Transformer Architecture </a:t>
+            </a:r>
+          </a:p>
+        </p:txBody>
+      </p:sp>
+      <p:sp>
+        <p:nvSpPr>
+          <p:cNvPr id="3" name="Content Placeholder 2">
+            <a:extLst>
+              <a:ext uri="{FF2B5EF4-FFF2-40B4-BE49-F238E27FC236}">
+                <a16:creationId xmlns:a16="http://schemas.microsoft.com/office/drawing/2014/main" id="{E90BA691-E9FA-9010-0DBE-FE9C66E399BD}"/>
+              </a:ext>
+            </a:extLst>
+          </p:cNvPr>
+          <p:cNvSpPr>
+            <a:spLocks noGrp="1"/>
+          </p:cNvSpPr>
+          <p:nvPr>
+            <p:ph idx="1"/>
+          </p:nvPr>
+        </p:nvSpPr>
+        <p:spPr>
+          <a:xfrm>
+            <a:off x="838200" y="1825625"/>
+            <a:ext cx="5257800" cy="4351338"/>
+          </a:xfrm>
+        </p:spPr>
+        <p:txBody>
+          <a:bodyPr/>
+          <a:lstStyle/>
+          <a:p>
+            <a:r>
+              <a:rPr lang="en-US" dirty="0"/>
+              <a:t>Training Inputs are encoded</a:t>
+            </a:r>
+          </a:p>
+          <a:p>
+            <a:r>
+              <a:rPr lang="en-US" dirty="0"/>
+              <a:t>Training Outputs are encoded</a:t>
+            </a:r>
+          </a:p>
+          <a:p>
+            <a:endParaRPr lang="en-US" dirty="0"/>
+          </a:p>
+        </p:txBody>
+      </p:sp>
+      <p:pic>
+        <p:nvPicPr>
+          <p:cNvPr id="6" name="Picture 5">
+            <a:extLst>
+              <a:ext uri="{FF2B5EF4-FFF2-40B4-BE49-F238E27FC236}">
+                <a16:creationId xmlns:a16="http://schemas.microsoft.com/office/drawing/2014/main" id="{8F8856AF-BEE3-7138-E07E-CB1DAE7AA4F1}"/>
+              </a:ext>
+            </a:extLst>
+          </p:cNvPr>
+          <p:cNvPicPr>
+            <a:picLocks noChangeAspect="1"/>
+          </p:cNvPicPr>
+          <p:nvPr/>
+        </p:nvPicPr>
+        <p:blipFill>
+          <a:blip r:embed="rId2"/>
+          <a:stretch>
+            <a:fillRect/>
+          </a:stretch>
+        </p:blipFill>
+        <p:spPr>
+          <a:xfrm>
+            <a:off x="7213673" y="626403"/>
+            <a:ext cx="4140127" cy="5833815"/>
+          </a:xfrm>
+          <a:prstGeom prst="rect">
+            <a:avLst/>
+          </a:prstGeom>
+        </p:spPr>
+      </p:pic>
+    </p:spTree>
+    <p:extLst>
+      <p:ext uri="{BB962C8B-B14F-4D97-AF65-F5344CB8AC3E}">
+        <p14:creationId xmlns:p14="http://schemas.microsoft.com/office/powerpoint/2010/main" val="4021749348"/>
+      </p:ext>
+    </p:extLst>
+  </p:cSld>
+  <p:clrMapOvr>
+    <a:masterClrMapping/>
+  </p:clrMapOvr>
+</p:sld>
+</file>
+
+<file path=ppt/slides/slide2.xml><?xml version="1.0" encoding="utf-8"?>
+<p:sld xmlns:a="http://schemas.openxmlformats.org/drawingml/2006/main" xmlns:r="http://schemas.openxmlformats.org/officeDocument/2006/relationships" xmlns:p="http://schemas.openxmlformats.org/presentationml/2006/main">
+  <p:cSld>
+    <p:spTree>
+      <p:nvGrpSpPr>
+        <p:cNvPr id="1" name=""/>
+        <p:cNvGrpSpPr/>
+        <p:nvPr/>
+      </p:nvGrpSpPr>
+      <p:grpSpPr>
+        <a:xfrm>
+          <a:off x="0" y="0"/>
+          <a:ext cx="0" cy="0"/>
+          <a:chOff x="0" y="0"/>
+          <a:chExt cx="0" cy="0"/>
+        </a:xfrm>
+      </p:grpSpPr>
+      <p:sp>
+        <p:nvSpPr>
+          <p:cNvPr id="2" name="Title 1">
+            <a:extLst>
+              <a:ext uri="{FF2B5EF4-FFF2-40B4-BE49-F238E27FC236}">
+                <a16:creationId xmlns:a16="http://schemas.microsoft.com/office/drawing/2014/main" id="{390E3F3E-65B6-6240-03A8-CFC353ABC565}"/>
+              </a:ext>
+            </a:extLst>
+          </p:cNvPr>
+          <p:cNvSpPr>
+            <a:spLocks noGrp="1"/>
+          </p:cNvSpPr>
+          <p:nvPr>
+            <p:ph type="title"/>
+          </p:nvPr>
+        </p:nvSpPr>
+        <p:spPr/>
+        <p:txBody>
+          <a:bodyPr/>
+          <a:lstStyle/>
+          <a:p>
+            <a:r>
+              <a:rPr lang="en-US" dirty="0"/>
+              <a:t>Executive Summary</a:t>
+            </a:r>
+          </a:p>
+        </p:txBody>
+      </p:sp>
+      <p:sp>
+        <p:nvSpPr>
+          <p:cNvPr id="3" name="Content Placeholder 2">
+            <a:extLst>
+              <a:ext uri="{FF2B5EF4-FFF2-40B4-BE49-F238E27FC236}">
+                <a16:creationId xmlns:a16="http://schemas.microsoft.com/office/drawing/2014/main" id="{D842D623-2F0C-080A-2C6F-AE06FC124212}"/>
+              </a:ext>
+            </a:extLst>
+          </p:cNvPr>
+          <p:cNvSpPr>
+            <a:spLocks noGrp="1"/>
+          </p:cNvSpPr>
+          <p:nvPr>
+            <p:ph idx="1"/>
+          </p:nvPr>
+        </p:nvSpPr>
+        <p:spPr/>
+        <p:txBody>
+          <a:bodyPr>
+            <a:normAutofit lnSpcReduction="10000"/>
+          </a:bodyPr>
+          <a:lstStyle/>
+          <a:p>
+            <a:r>
+              <a:rPr lang="en-US" dirty="0"/>
+              <a:t>Updated goal: Use Transformer model to predict bike rental demand</a:t>
+            </a:r>
+          </a:p>
+          <a:p>
+            <a:pPr lvl="1"/>
+            <a:r>
+              <a:rPr lang="en-US" dirty="0"/>
+              <a:t>Demand can then be used to determine bike rental rate</a:t>
+            </a:r>
+          </a:p>
+          <a:p>
+            <a:r>
+              <a:rPr lang="en-US" dirty="0"/>
+              <a:t>Many factors affect bike rental demand</a:t>
+            </a:r>
+          </a:p>
+          <a:p>
+            <a:pPr lvl="1"/>
+            <a:r>
+              <a:rPr lang="en-US" dirty="0"/>
+              <a:t>Feels like temperature and season have the strongest effects on demand</a:t>
+            </a:r>
+          </a:p>
+          <a:p>
+            <a:pPr lvl="1"/>
+            <a:r>
+              <a:rPr lang="en-US" dirty="0"/>
+              <a:t>By adjusting rental rates depending on weather and time of year, XYZ company can increase profits and rental fleet utilization</a:t>
+            </a:r>
+          </a:p>
+          <a:p>
+            <a:r>
+              <a:rPr lang="en-US" dirty="0"/>
+              <a:t>This project is an introduction to the possibilities of using machine learning in the future to optimize profits</a:t>
+            </a:r>
+          </a:p>
+          <a:p>
+            <a:r>
+              <a:rPr lang="en-US" dirty="0"/>
+              <a:t>Future model can be used to determine daily demand using weather forecasts and other public information.</a:t>
+            </a:r>
+          </a:p>
+          <a:p>
+            <a:pPr lvl="1"/>
+            <a:r>
+              <a:rPr lang="en-US" dirty="0"/>
+              <a:t>Thus, reducing the risk of public scrutiny</a:t>
+            </a:r>
+          </a:p>
+        </p:txBody>
+      </p:sp>
+    </p:spTree>
+    <p:extLst>
+      <p:ext uri="{BB962C8B-B14F-4D97-AF65-F5344CB8AC3E}">
+        <p14:creationId xmlns:p14="http://schemas.microsoft.com/office/powerpoint/2010/main" val="3962293737"/>
+      </p:ext>
+    </p:extLst>
+  </p:cSld>
+  <p:clrMapOvr>
+    <a:masterClrMapping/>
+  </p:clrMapOvr>
+</p:sld>
+</file>
+
+<file path=ppt/slides/slide3.xml><?xml version="1.0" encoding="utf-8"?>
+<p:sld xmlns:a="http://schemas.openxmlformats.org/drawingml/2006/main" xmlns:r="http://schemas.openxmlformats.org/officeDocument/2006/relationships" xmlns:p="http://schemas.openxmlformats.org/presentationml/2006/main">
+  <p:cSld>
+    <p:spTree>
+      <p:nvGrpSpPr>
+        <p:cNvPr id="1" name=""/>
+        <p:cNvGrpSpPr/>
+        <p:nvPr/>
+      </p:nvGrpSpPr>
+      <p:grpSpPr>
+        <a:xfrm>
+          <a:off x="0" y="0"/>
+          <a:ext cx="0" cy="0"/>
+          <a:chOff x="0" y="0"/>
+          <a:chExt cx="0" cy="0"/>
+        </a:xfrm>
+      </p:grpSpPr>
+      <p:sp>
+        <p:nvSpPr>
+          <p:cNvPr id="2" name="Title 1">
+            <a:extLst>
+              <a:ext uri="{FF2B5EF4-FFF2-40B4-BE49-F238E27FC236}">
+                <a16:creationId xmlns:a16="http://schemas.microsoft.com/office/drawing/2014/main" id="{7F9883DD-99B1-EA75-F54B-0B3F7D35331E}"/>
+              </a:ext>
+            </a:extLst>
+          </p:cNvPr>
+          <p:cNvSpPr>
+            <a:spLocks noGrp="1"/>
+          </p:cNvSpPr>
+          <p:nvPr>
+            <p:ph type="title"/>
+          </p:nvPr>
+        </p:nvSpPr>
+        <p:spPr/>
+        <p:txBody>
+          <a:bodyPr/>
+          <a:lstStyle/>
+          <a:p>
+            <a:r>
+              <a:rPr lang="en-US" dirty="0"/>
+              <a:t>Approach</a:t>
+            </a:r>
+          </a:p>
+        </p:txBody>
+      </p:sp>
+      <p:sp>
+        <p:nvSpPr>
+          <p:cNvPr id="3" name="Content Placeholder 2">
+            <a:extLst>
+              <a:ext uri="{FF2B5EF4-FFF2-40B4-BE49-F238E27FC236}">
+                <a16:creationId xmlns:a16="http://schemas.microsoft.com/office/drawing/2014/main" id="{81FB4B79-71EC-F7F5-F000-C5AAE2E189C1}"/>
+              </a:ext>
+            </a:extLst>
+          </p:cNvPr>
+          <p:cNvSpPr>
+            <a:spLocks noGrp="1"/>
+          </p:cNvSpPr>
+          <p:nvPr>
+            <p:ph idx="1"/>
+          </p:nvPr>
+        </p:nvSpPr>
+        <p:spPr/>
+        <p:txBody>
+          <a:bodyPr/>
+          <a:lstStyle/>
+          <a:p>
+            <a:r>
+              <a:rPr lang="en-US" dirty="0"/>
+              <a:t>Use Neural Network Forecaster: the Transformer model to predict bike rental demand</a:t>
+            </a:r>
+          </a:p>
+          <a:p>
+            <a:r>
+              <a:rPr lang="en-US" dirty="0"/>
+              <a:t>Data Source: Kaggle Bike Count Prediction Multivariate Data Set</a:t>
+            </a:r>
+          </a:p>
+          <a:p>
+            <a:pPr lvl="1"/>
+            <a:r>
+              <a:rPr lang="en-US" dirty="0"/>
+              <a:t>Included weather related features</a:t>
+            </a:r>
+          </a:p>
+          <a:p>
+            <a:r>
+              <a:rPr lang="en-US" dirty="0"/>
+              <a:t>Examined the impact of non-time-series features on rental demand</a:t>
+            </a:r>
+          </a:p>
+          <a:p>
+            <a:r>
+              <a:rPr lang="en-US" dirty="0"/>
+              <a:t>Used Python and Darts to create model</a:t>
+            </a:r>
+          </a:p>
+          <a:p>
+            <a:r>
+              <a:rPr lang="en-US" dirty="0"/>
+              <a:t>Export Tensor Model to be deployed if applicable</a:t>
+            </a:r>
+          </a:p>
+          <a:p>
+            <a:pPr marL="0" indent="0">
+              <a:buNone/>
+            </a:pPr>
+            <a:endParaRPr lang="en-US" dirty="0"/>
+          </a:p>
+          <a:p>
+            <a:endParaRPr lang="en-US" dirty="0"/>
+          </a:p>
+        </p:txBody>
+      </p:sp>
+    </p:spTree>
+    <p:extLst>
+      <p:ext uri="{BB962C8B-B14F-4D97-AF65-F5344CB8AC3E}">
+        <p14:creationId xmlns:p14="http://schemas.microsoft.com/office/powerpoint/2010/main" val="254180623"/>
+      </p:ext>
+    </p:extLst>
+  </p:cSld>
+  <p:clrMapOvr>
+    <a:masterClrMapping/>
+  </p:clrMapOvr>
+</p:sld>
+</file>
+
+<file path=ppt/slides/slide4.xml><?xml version="1.0" encoding="utf-8"?>
+<p:sld xmlns:a="http://schemas.openxmlformats.org/drawingml/2006/main" xmlns:r="http://schemas.openxmlformats.org/officeDocument/2006/relationships" xmlns:p="http://schemas.openxmlformats.org/presentationml/2006/main">
+  <p:cSld>
+    <p:spTree>
+      <p:nvGrpSpPr>
+        <p:cNvPr id="1" name=""/>
+        <p:cNvGrpSpPr/>
+        <p:nvPr/>
+      </p:nvGrpSpPr>
+      <p:grpSpPr>
+        <a:xfrm>
+          <a:off x="0" y="0"/>
+          <a:ext cx="0" cy="0"/>
+          <a:chOff x="0" y="0"/>
+          <a:chExt cx="0" cy="0"/>
+        </a:xfrm>
+      </p:grpSpPr>
+      <p:sp>
+        <p:nvSpPr>
+          <p:cNvPr id="2" name="Title 1">
+            <a:extLst>
+              <a:ext uri="{FF2B5EF4-FFF2-40B4-BE49-F238E27FC236}">
+                <a16:creationId xmlns:a16="http://schemas.microsoft.com/office/drawing/2014/main" id="{F136F96A-F52F-4B7B-6419-7DB727E2B64A}"/>
+              </a:ext>
+            </a:extLst>
+          </p:cNvPr>
+          <p:cNvSpPr>
+            <a:spLocks noGrp="1"/>
+          </p:cNvSpPr>
+          <p:nvPr>
+            <p:ph type="title"/>
+          </p:nvPr>
+        </p:nvSpPr>
+        <p:spPr/>
+        <p:txBody>
+          <a:bodyPr/>
+          <a:lstStyle/>
+          <a:p>
+            <a:r>
+              <a:rPr lang="en-US" dirty="0"/>
+              <a:t>Model Description</a:t>
+            </a:r>
+          </a:p>
+        </p:txBody>
+      </p:sp>
+      <p:sp>
+        <p:nvSpPr>
+          <p:cNvPr id="3" name="Content Placeholder 2">
+            <a:extLst>
+              <a:ext uri="{FF2B5EF4-FFF2-40B4-BE49-F238E27FC236}">
+                <a16:creationId xmlns:a16="http://schemas.microsoft.com/office/drawing/2014/main" id="{9AFB72EB-C8FC-F8B8-BEFE-092B415F9F89}"/>
+              </a:ext>
+            </a:extLst>
+          </p:cNvPr>
+          <p:cNvSpPr>
+            <a:spLocks noGrp="1"/>
+          </p:cNvSpPr>
+          <p:nvPr>
+            <p:ph idx="1"/>
+          </p:nvPr>
+        </p:nvSpPr>
+        <p:spPr/>
+        <p:txBody>
+          <a:bodyPr>
+            <a:normAutofit fontScale="70000" lnSpcReduction="20000"/>
+          </a:bodyPr>
+          <a:lstStyle/>
+          <a:p>
+            <a:r>
+              <a:rPr lang="en-US" dirty="0"/>
+              <a:t>Overview of basic methodology: Predict the number of rides during the day using probabilistic forecast which wraps the central point between uncertainty bands (0.01, 0.05, 0.50, 0.95, 0.99)</a:t>
+            </a:r>
+          </a:p>
+          <a:p>
+            <a:r>
+              <a:rPr lang="en-US" dirty="0"/>
+              <a:t>Model: </a:t>
+            </a:r>
+            <a:r>
+              <a:rPr lang="en-US" dirty="0" err="1"/>
+              <a:t>TransformerModel</a:t>
+            </a:r>
+            <a:endParaRPr lang="en-US" dirty="0"/>
+          </a:p>
+          <a:p>
+            <a:r>
+              <a:rPr lang="en-US" dirty="0"/>
+              <a:t>Dependent variable: Bike rental count (daily)</a:t>
+            </a:r>
+          </a:p>
+          <a:p>
+            <a:r>
+              <a:rPr lang="en-US" dirty="0"/>
+              <a:t>Scope:</a:t>
+            </a:r>
+          </a:p>
+          <a:p>
+            <a:pPr lvl="1"/>
+            <a:r>
+              <a:rPr lang="en-US" dirty="0"/>
+              <a:t>Bike rental company in unknown city with over 4,500+ daily rides</a:t>
+            </a:r>
+          </a:p>
+          <a:p>
+            <a:r>
+              <a:rPr lang="en-US" dirty="0"/>
+              <a:t>Sampling</a:t>
+            </a:r>
+          </a:p>
+          <a:p>
+            <a:pPr lvl="1"/>
+            <a:r>
+              <a:rPr lang="en-US" dirty="0"/>
+              <a:t>training </a:t>
+            </a:r>
+          </a:p>
+          <a:p>
+            <a:pPr lvl="2"/>
+            <a:r>
+              <a:rPr lang="en-US" dirty="0"/>
+              <a:t>start: 2011-01-01</a:t>
+            </a:r>
+          </a:p>
+          <a:p>
+            <a:pPr lvl="2"/>
+            <a:r>
+              <a:rPr lang="en-US" dirty="0"/>
+              <a:t>end: 2012-08-21</a:t>
+            </a:r>
+          </a:p>
+          <a:p>
+            <a:pPr lvl="2"/>
+            <a:r>
+              <a:rPr lang="en-US" dirty="0"/>
+              <a:t>duration: 598 days </a:t>
+            </a:r>
+          </a:p>
+          <a:p>
+            <a:pPr lvl="1"/>
+            <a:r>
+              <a:rPr lang="en-US" dirty="0"/>
+              <a:t>test </a:t>
+            </a:r>
+          </a:p>
+          <a:p>
+            <a:pPr lvl="2"/>
+            <a:r>
+              <a:rPr lang="en-US" dirty="0"/>
+              <a:t>start: 2012-08-22 </a:t>
+            </a:r>
+          </a:p>
+          <a:p>
+            <a:pPr lvl="2"/>
+            <a:r>
+              <a:rPr lang="en-US" dirty="0"/>
+              <a:t>end: 2012-10-27 </a:t>
+            </a:r>
+          </a:p>
+          <a:p>
+            <a:pPr lvl="1"/>
+            <a:r>
+              <a:rPr lang="en-US" dirty="0"/>
+              <a:t>duration: 66 days</a:t>
+            </a:r>
+          </a:p>
+          <a:p>
+            <a:r>
+              <a:rPr lang="en-US" dirty="0"/>
+              <a:t>The model takes 5+ minutes to train </a:t>
+            </a:r>
+          </a:p>
+        </p:txBody>
+      </p:sp>
+    </p:spTree>
+    <p:extLst>
+      <p:ext uri="{BB962C8B-B14F-4D97-AF65-F5344CB8AC3E}">
+        <p14:creationId xmlns:p14="http://schemas.microsoft.com/office/powerpoint/2010/main" val="2853737377"/>
+      </p:ext>
+    </p:extLst>
+  </p:cSld>
+  <p:clrMapOvr>
+    <a:masterClrMapping/>
+  </p:clrMapOvr>
+</p:sld>
+</file>
+
+<file path=ppt/slides/slide5.xml><?xml version="1.0" encoding="utf-8"?>
+<p:sld xmlns:a="http://schemas.openxmlformats.org/drawingml/2006/main" xmlns:r="http://schemas.openxmlformats.org/officeDocument/2006/relationships" xmlns:p="http://schemas.openxmlformats.org/presentationml/2006/main">
+  <p:cSld>
+    <p:spTree>
+      <p:nvGrpSpPr>
+        <p:cNvPr id="1" name=""/>
+        <p:cNvGrpSpPr/>
+        <p:nvPr/>
+      </p:nvGrpSpPr>
+      <p:grpSpPr>
+        <a:xfrm>
+          <a:off x="0" y="0"/>
+          <a:ext cx="0" cy="0"/>
+          <a:chOff x="0" y="0"/>
+          <a:chExt cx="0" cy="0"/>
+        </a:xfrm>
+      </p:grpSpPr>
+      <p:sp>
+        <p:nvSpPr>
+          <p:cNvPr id="2" name="Title 1">
+            <a:extLst>
+              <a:ext uri="{FF2B5EF4-FFF2-40B4-BE49-F238E27FC236}">
+                <a16:creationId xmlns:a16="http://schemas.microsoft.com/office/drawing/2014/main" id="{10A687C3-4208-600C-E6A0-DFAD23FBB251}"/>
+              </a:ext>
+            </a:extLst>
+          </p:cNvPr>
+          <p:cNvSpPr>
+            <a:spLocks noGrp="1"/>
+          </p:cNvSpPr>
+          <p:nvPr>
+            <p:ph type="title"/>
+          </p:nvPr>
+        </p:nvSpPr>
+        <p:spPr/>
+        <p:txBody>
+          <a:bodyPr/>
+          <a:lstStyle/>
+          <a:p>
+            <a:r>
+              <a:rPr lang="en-US" dirty="0"/>
+              <a:t>Model Details</a:t>
+            </a:r>
+          </a:p>
+        </p:txBody>
+      </p:sp>
+      <p:sp>
+        <p:nvSpPr>
+          <p:cNvPr id="3" name="Content Placeholder 2">
+            <a:extLst>
+              <a:ext uri="{FF2B5EF4-FFF2-40B4-BE49-F238E27FC236}">
+                <a16:creationId xmlns:a16="http://schemas.microsoft.com/office/drawing/2014/main" id="{EE70D1B5-1441-98AF-06E0-52ACEEF26DF1}"/>
+              </a:ext>
+            </a:extLst>
+          </p:cNvPr>
+          <p:cNvSpPr>
+            <a:spLocks noGrp="1"/>
+          </p:cNvSpPr>
+          <p:nvPr>
+            <p:ph idx="1"/>
+          </p:nvPr>
+        </p:nvSpPr>
+        <p:spPr>
+          <a:xfrm>
+            <a:off x="838200" y="1825625"/>
+            <a:ext cx="5257800" cy="4351338"/>
+          </a:xfrm>
+        </p:spPr>
+        <p:txBody>
+          <a:bodyPr>
+            <a:normAutofit fontScale="92500" lnSpcReduction="10000"/>
+          </a:bodyPr>
+          <a:lstStyle/>
+          <a:p>
+            <a:r>
+              <a:rPr lang="en-US" dirty="0"/>
               <a:t>Candidate variables: </a:t>
             </a:r>
           </a:p>
           <a:p>
             <a:pPr lvl="1"/>
             <a:r>
-              <a:rPr lang="en-US" dirty="0"/>
-              <a:t>season</a:t>
+              <a:rPr lang="en-US" dirty="0">
+                <a:highlight>
+                  <a:srgbClr val="FFFF00"/>
+                </a:highlight>
+              </a:rPr>
+              <a:t>feels like temp</a:t>
             </a:r>
           </a:p>
           <a:p>
             <a:pPr lvl="1"/>
             <a:r>
-              <a:rPr lang="en-US" dirty="0"/>
-              <a:t>holiday
-working day
+              <a:rPr lang="en-US" dirty="0">
+                <a:highlight>
+                  <a:srgbClr val="FFFF00"/>
+                </a:highlight>
+              </a:rPr>
+              <a:t>temp </a:t>
+            </a:r>
+          </a:p>
+          <a:p>
+            <a:pPr lvl="1"/>
+            <a:r>
+              <a:rPr lang="en-US" dirty="0">
+                <a:highlight>
+                  <a:srgbClr val="FFFF00"/>
+                </a:highlight>
+              </a:rPr>
+              <a:t>season
 weather
-temp
-</a:t>
+wind speed</a:t>
+            </a:r>
+          </a:p>
+          <a:p>
+            <a:pPr lvl="1"/>
+            <a:r>
+              <a:rPr lang="en-US" dirty="0"/>
+              <a:t>working day 
+humidity
+holiday</a:t>
+            </a:r>
+          </a:p>
+          <a:p>
+            <a:r>
+              <a:rPr lang="en-US" dirty="0"/>
+              <a:t>Feature selection</a:t>
+            </a:r>
+          </a:p>
+          <a:p>
+            <a:pPr lvl="1"/>
+            <a:r>
+              <a:rPr lang="en-US" dirty="0"/>
+              <a:t>Drop features based on correlation to target feature</a:t>
+            </a:r>
+          </a:p>
+          <a:p>
+            <a:endParaRPr lang="en-US" dirty="0"/>
+          </a:p>
+        </p:txBody>
+      </p:sp>
+      <p:sp>
+        <p:nvSpPr>
+          <p:cNvPr id="4" name="Content Placeholder 2">
+            <a:extLst>
+              <a:ext uri="{FF2B5EF4-FFF2-40B4-BE49-F238E27FC236}">
+                <a16:creationId xmlns:a16="http://schemas.microsoft.com/office/drawing/2014/main" id="{AA676938-4CAF-D316-A3EB-74DC4180FCF7}"/>
+              </a:ext>
+            </a:extLst>
+          </p:cNvPr>
+          <p:cNvSpPr txBox="1">
+            <a:spLocks/>
+          </p:cNvSpPr>
+          <p:nvPr/>
+        </p:nvSpPr>
+        <p:spPr>
+          <a:xfrm>
+            <a:off x="6096000" y="1825625"/>
+            <a:ext cx="5257800" cy="4351338"/>
+          </a:xfrm>
+          <a:prstGeom prst="rect">
+            <a:avLst/>
+          </a:prstGeom>
+        </p:spPr>
+        <p:txBody>
+          <a:bodyPr vert="horz" lIns="91440" tIns="45720" rIns="91440" bIns="45720" rtlCol="0">
+            <a:normAutofit/>
+          </a:bodyPr>
+          <a:lstStyle>
+            <a:lvl1pPr marL="228600" indent="-228600" algn="l" defTabSz="914400" rtl="0" eaLnBrk="1" latinLnBrk="0" hangingPunct="1">
+              <a:lnSpc>
+                <a:spcPct val="90000"/>
+              </a:lnSpc>
+              <a:spcBef>
+                <a:spcPts val="1000"/>
+              </a:spcBef>
+              <a:buFont typeface="Arial" panose="020B0604020202020204" pitchFamily="34" charset="0"/>
+              <a:buChar char="•"/>
+              <a:defRPr sz="2800" kern="1200">
+                <a:solidFill>
+                  <a:schemeClr val="tx1"/>
+                </a:solidFill>
+                <a:latin typeface="+mn-lt"/>
+                <a:ea typeface="+mn-ea"/>
+                <a:cs typeface="+mn-cs"/>
+              </a:defRPr>
+            </a:lvl1pPr>
+            <a:lvl2pPr marL="685800" indent="-228600" algn="l" defTabSz="914400" rtl="0" eaLnBrk="1" latinLnBrk="0" hangingPunct="1">
+              <a:lnSpc>
+                <a:spcPct val="90000"/>
+              </a:lnSpc>
+              <a:spcBef>
+                <a:spcPts val="500"/>
+              </a:spcBef>
+              <a:buFont typeface="Arial" panose="020B0604020202020204" pitchFamily="34" charset="0"/>
+              <a:buChar char="•"/>
+              <a:defRPr sz="2400" kern="1200">
+                <a:solidFill>
+                  <a:schemeClr val="tx1"/>
+                </a:solidFill>
+                <a:latin typeface="+mn-lt"/>
+                <a:ea typeface="+mn-ea"/>
+                <a:cs typeface="+mn-cs"/>
+              </a:defRPr>
+            </a:lvl2pPr>
+            <a:lvl3pPr marL="1143000" indent="-228600" algn="l" defTabSz="914400" rtl="0" eaLnBrk="1" latinLnBrk="0" hangingPunct="1">
+              <a:lnSpc>
+                <a:spcPct val="90000"/>
+              </a:lnSpc>
+              <a:spcBef>
+                <a:spcPts val="500"/>
+              </a:spcBef>
+              <a:buFont typeface="Arial" panose="020B0604020202020204" pitchFamily="34" charset="0"/>
+              <a:buChar char="•"/>
+              <a:defRPr sz="2000" kern="1200">
+                <a:solidFill>
+                  <a:schemeClr val="tx1"/>
+                </a:solidFill>
+                <a:latin typeface="+mn-lt"/>
+                <a:ea typeface="+mn-ea"/>
+                <a:cs typeface="+mn-cs"/>
+              </a:defRPr>
+            </a:lvl3pPr>
+            <a:lvl4pPr marL="1600200" indent="-228600" algn="l" defTabSz="914400" rtl="0" eaLnBrk="1" latinLnBrk="0" hangingPunct="1">
+              <a:lnSpc>
+                <a:spcPct val="90000"/>
+              </a:lnSpc>
+              <a:spcBef>
+                <a:spcPts val="500"/>
+              </a:spcBef>
+              <a:buFont typeface="Arial" panose="020B0604020202020204" pitchFamily="34" charset="0"/>
+              <a:buChar char="•"/>
+              <a:defRPr sz="1800" kern="1200">
+                <a:solidFill>
+                  <a:schemeClr val="tx1"/>
+                </a:solidFill>
+                <a:latin typeface="+mn-lt"/>
+                <a:ea typeface="+mn-ea"/>
+                <a:cs typeface="+mn-cs"/>
+              </a:defRPr>
+            </a:lvl4pPr>
+            <a:lvl5pPr marL="2057400" indent="-228600" algn="l" defTabSz="914400" rtl="0" eaLnBrk="1" latinLnBrk="0" hangingPunct="1">
+              <a:lnSpc>
+                <a:spcPct val="90000"/>
+              </a:lnSpc>
+              <a:spcBef>
+                <a:spcPts val="500"/>
+              </a:spcBef>
+              <a:buFont typeface="Arial" panose="020B0604020202020204" pitchFamily="34" charset="0"/>
+              <a:buChar char="•"/>
+              <a:defRPr sz="1800" kern="1200">
+                <a:solidFill>
+                  <a:schemeClr val="tx1"/>
+                </a:solidFill>
+                <a:latin typeface="+mn-lt"/>
+                <a:ea typeface="+mn-ea"/>
+                <a:cs typeface="+mn-cs"/>
+              </a:defRPr>
+            </a:lvl5pPr>
+            <a:lvl6pPr marL="2514600" indent="-228600" algn="l" defTabSz="914400" rtl="0" eaLnBrk="1" latinLnBrk="0" hangingPunct="1">
+              <a:lnSpc>
+                <a:spcPct val="90000"/>
+              </a:lnSpc>
+              <a:spcBef>
+                <a:spcPts val="500"/>
+              </a:spcBef>
+              <a:buFont typeface="Arial" panose="020B0604020202020204" pitchFamily="34" charset="0"/>
+              <a:buChar char="•"/>
+              <a:defRPr sz="1800" kern="1200">
+                <a:solidFill>
+                  <a:schemeClr val="tx1"/>
+                </a:solidFill>
+                <a:latin typeface="+mn-lt"/>
+                <a:ea typeface="+mn-ea"/>
+                <a:cs typeface="+mn-cs"/>
+              </a:defRPr>
+            </a:lvl6pPr>
+            <a:lvl7pPr marL="2971800" indent="-228600" algn="l" defTabSz="914400" rtl="0" eaLnBrk="1" latinLnBrk="0" hangingPunct="1">
+              <a:lnSpc>
+                <a:spcPct val="90000"/>
+              </a:lnSpc>
+              <a:spcBef>
+                <a:spcPts val="500"/>
+              </a:spcBef>
+              <a:buFont typeface="Arial" panose="020B0604020202020204" pitchFamily="34" charset="0"/>
+              <a:buChar char="•"/>
+              <a:defRPr sz="1800" kern="1200">
+                <a:solidFill>
+                  <a:schemeClr val="tx1"/>
+                </a:solidFill>
+                <a:latin typeface="+mn-lt"/>
+                <a:ea typeface="+mn-ea"/>
+                <a:cs typeface="+mn-cs"/>
+              </a:defRPr>
+            </a:lvl7pPr>
+            <a:lvl8pPr marL="3429000" indent="-228600" algn="l" defTabSz="914400" rtl="0" eaLnBrk="1" latinLnBrk="0" hangingPunct="1">
+              <a:lnSpc>
+                <a:spcPct val="90000"/>
+              </a:lnSpc>
+              <a:spcBef>
+                <a:spcPts val="500"/>
+              </a:spcBef>
+              <a:buFont typeface="Arial" panose="020B0604020202020204" pitchFamily="34" charset="0"/>
+              <a:buChar char="•"/>
+              <a:defRPr sz="1800" kern="1200">
+                <a:solidFill>
+                  <a:schemeClr val="tx1"/>
+                </a:solidFill>
+                <a:latin typeface="+mn-lt"/>
+                <a:ea typeface="+mn-ea"/>
+                <a:cs typeface="+mn-cs"/>
+              </a:defRPr>
+            </a:lvl8pPr>
+            <a:lvl9pPr marL="3886200" indent="-228600" algn="l" defTabSz="914400" rtl="0" eaLnBrk="1" latinLnBrk="0" hangingPunct="1">
+              <a:lnSpc>
+                <a:spcPct val="90000"/>
+              </a:lnSpc>
+              <a:spcBef>
+                <a:spcPts val="500"/>
+              </a:spcBef>
+              <a:buFont typeface="Arial" panose="020B0604020202020204" pitchFamily="34" charset="0"/>
+              <a:buChar char="•"/>
+              <a:defRPr sz="1800" kern="1200">
+                <a:solidFill>
+                  <a:schemeClr val="tx1"/>
+                </a:solidFill>
+                <a:latin typeface="+mn-lt"/>
+                <a:ea typeface="+mn-ea"/>
+                <a:cs typeface="+mn-cs"/>
+              </a:defRPr>
+            </a:lvl9pPr>
+          </a:lstStyle>
+          <a:p>
+            <a:r>
+              <a:rPr lang="en-US" dirty="0"/>
+              <a:t>Additional covariates added: </a:t>
+            </a:r>
+          </a:p>
+          <a:p>
+            <a:pPr lvl="1"/>
+            <a:r>
+              <a:rPr lang="en-US" dirty="0"/>
+              <a:t>Day of the week</a:t>
+            </a:r>
+          </a:p>
+          <a:p>
+            <a:pPr lvl="1"/>
+            <a:r>
+              <a:rPr lang="en-US" dirty="0"/>
+              <a:t>Month</a:t>
+            </a:r>
+          </a:p>
+          <a:p>
+            <a:r>
+              <a:rPr lang="en-US" dirty="0"/>
+              <a:t>Model Parameters</a:t>
+            </a:r>
+          </a:p>
+          <a:p>
+            <a:pPr lvl="1"/>
+            <a:r>
+              <a:rPr lang="en-US" dirty="0"/>
+              <a:t>EPOCHS = 200</a:t>
+            </a:r>
+          </a:p>
+          <a:p>
+            <a:pPr lvl="1"/>
+            <a:r>
+              <a:rPr lang="en-US" dirty="0"/>
+              <a:t>likelihood=</a:t>
             </a:r>
             <a:r>
               <a:rPr lang="en-US" dirty="0" err="1"/>
-              <a:t>atemp</a:t>
-            </a:r>
-            <a:r>
-              <a:rPr lang="en-US" dirty="0"/>
-              <a:t>
-humidity
-wind speed</a:t>
-            </a:r>
+              <a:t>QuantileRegression</a:t>
+            </a:r>
+            <a:r>
+              <a:rPr lang="en-US" dirty="0"/>
+              <a:t>()</a:t>
+            </a:r>
+          </a:p>
+          <a:p>
+            <a:pPr lvl="1"/>
+            <a:r>
+              <a:rPr lang="en-US" dirty="0"/>
+              <a:t>Reduce computation usage</a:t>
+            </a:r>
+          </a:p>
+          <a:p>
+            <a:pPr lvl="1"/>
+            <a:endParaRPr lang="en-US" dirty="0"/>
           </a:p>
           <a:p>
             <a:endParaRPr lang="en-US" dirty="0"/>
@@ -4192,7 +5320,7 @@
           <p:cNvPr id="2" name="Title 1">
             <a:extLst>
               <a:ext uri="{FF2B5EF4-FFF2-40B4-BE49-F238E27FC236}">
-                <a16:creationId xmlns:a16="http://schemas.microsoft.com/office/drawing/2014/main" id="{3B9F6AA2-A874-63AA-C927-29E80248FE75}"/>
+                <a16:creationId xmlns:a16="http://schemas.microsoft.com/office/drawing/2014/main" id="{677419DD-BBE3-F84E-AEB1-A6B4909918EB}"/>
               </a:ext>
             </a:extLst>
           </p:cNvPr>
@@ -4210,7 +5338,7 @@
           <a:p>
             <a:r>
               <a:rPr lang="en-US" dirty="0"/>
-              <a:t>Recommendations</a:t>
+              <a:t>Challenges</a:t>
             </a:r>
           </a:p>
         </p:txBody>
@@ -4220,7 +5348,7 @@
           <p:cNvPr id="3" name="Content Placeholder 2">
             <a:extLst>
               <a:ext uri="{FF2B5EF4-FFF2-40B4-BE49-F238E27FC236}">
-                <a16:creationId xmlns:a16="http://schemas.microsoft.com/office/drawing/2014/main" id="{DB589A7B-0670-9A81-483A-DF7B5F5E88F0}"/>
+                <a16:creationId xmlns:a16="http://schemas.microsoft.com/office/drawing/2014/main" id="{C57E88E5-0D50-856A-D481-67669B244295}"/>
               </a:ext>
             </a:extLst>
           </p:cNvPr>
@@ -4236,14 +5364,55 @@
           <a:bodyPr/>
           <a:lstStyle/>
           <a:p>
-            <a:endParaRPr lang="en-US"/>
+            <a:r>
+              <a:rPr lang="en-US" dirty="0"/>
+              <a:t>Transformer Model is very complex and is not typically used for multivariate time series</a:t>
+            </a:r>
+          </a:p>
+          <a:p>
+            <a:pPr lvl="1"/>
+            <a:r>
+              <a:rPr lang="en-US" dirty="0"/>
+              <a:t>Difficulty finding research using this technique</a:t>
+            </a:r>
+          </a:p>
+          <a:p>
+            <a:pPr lvl="1"/>
+            <a:r>
+              <a:rPr lang="en-US" dirty="0"/>
+              <a:t>Difficulty finding help on stack overflow using this technique</a:t>
+            </a:r>
+          </a:p>
+          <a:p>
+            <a:pPr lvl="1"/>
+            <a:r>
+              <a:rPr lang="en-US" dirty="0"/>
+              <a:t>Most explanations of Transformer Model were related to Natural Language Processing</a:t>
+            </a:r>
+          </a:p>
+          <a:p>
+            <a:r>
+              <a:rPr lang="en-US" dirty="0"/>
+              <a:t>I was not able to get the model to work using hourly data points</a:t>
+            </a:r>
+          </a:p>
+          <a:p>
+            <a:r>
+              <a:rPr lang="en-US" dirty="0"/>
+              <a:t>Feels like temp and temp are not independent but were </a:t>
+            </a:r>
+            <a:r>
+              <a:rPr lang="en-US"/>
+              <a:t>both included</a:t>
+            </a:r>
+            <a:endParaRPr lang="en-US" dirty="0"/>
           </a:p>
         </p:txBody>
       </p:sp>
     </p:spTree>
     <p:extLst>
       <p:ext uri="{BB962C8B-B14F-4D97-AF65-F5344CB8AC3E}">
-        <p14:creationId xmlns:p14="http://schemas.microsoft.com/office/powerpoint/2010/main" val="3315713905"/>
+        <p14:creationId xmlns:p14="http://schemas.microsoft.com/office/powerpoint/2010/main" val="2963978440"/>
       </p:ext>
     </p:extLst>
   </p:cSld>
@@ -4275,7 +5444,7 @@
           <p:cNvPr id="2" name="Title 1">
             <a:extLst>
               <a:ext uri="{FF2B5EF4-FFF2-40B4-BE49-F238E27FC236}">
-                <a16:creationId xmlns:a16="http://schemas.microsoft.com/office/drawing/2014/main" id="{5766D0D4-958D-2D0A-3F52-2A2009B43F39}"/>
+                <a16:creationId xmlns:a16="http://schemas.microsoft.com/office/drawing/2014/main" id="{3B9F6AA2-A874-63AA-C927-29E80248FE75}"/>
               </a:ext>
             </a:extLst>
           </p:cNvPr>
@@ -4293,7 +5462,7 @@
           <a:p>
             <a:r>
               <a:rPr lang="en-US" dirty="0"/>
-              <a:t>Data Wrangling</a:t>
+              <a:t>Recommendations and Future Research</a:t>
             </a:r>
           </a:p>
         </p:txBody>
@@ -4303,7 +5472,7 @@
           <p:cNvPr id="3" name="Content Placeholder 2">
             <a:extLst>
               <a:ext uri="{FF2B5EF4-FFF2-40B4-BE49-F238E27FC236}">
-                <a16:creationId xmlns:a16="http://schemas.microsoft.com/office/drawing/2014/main" id="{1B98A978-49C1-D7C5-D77F-7120FAE8362F}"/>
+                <a16:creationId xmlns:a16="http://schemas.microsoft.com/office/drawing/2014/main" id="{DB589A7B-0670-9A81-483A-DF7B5F5E88F0}"/>
               </a:ext>
             </a:extLst>
           </p:cNvPr>
@@ -4316,18 +5485,55 @@
         </p:nvSpPr>
         <p:spPr/>
         <p:txBody>
-          <a:bodyPr/>
-          <a:lstStyle/>
-          <a:p>
-            <a:r>
-              <a:rPr lang="en-US" dirty="0"/>
-              <a:t>Find and correct missing values</a:t>
-            </a:r>
-          </a:p>
-          <a:p>
-            <a:endParaRPr lang="en-US" dirty="0"/>
-          </a:p>
-          <a:p>
+          <a:bodyPr>
+            <a:normAutofit fontScale="92500" lnSpcReduction="10000"/>
+          </a:bodyPr>
+          <a:lstStyle/>
+          <a:p>
+            <a:r>
+              <a:rPr lang="en-US" dirty="0"/>
+              <a:t>Begin using model to predict daily bike demand without changing price, tracking accuracy</a:t>
+            </a:r>
+          </a:p>
+          <a:p>
+            <a:r>
+              <a:rPr lang="en-US" dirty="0"/>
+              <a:t>Compare this model to models currently used at the company to determine accuracy</a:t>
+            </a:r>
+          </a:p>
+          <a:p>
+            <a:r>
+              <a:rPr lang="en-US" dirty="0"/>
+              <a:t>Use forecast in conjunction with revenue forecast to determine if variable pricing is the correct choice</a:t>
+            </a:r>
+          </a:p>
+          <a:p>
+            <a:r>
+              <a:rPr lang="en-US" dirty="0"/>
+              <a:t>Tune parameters to allow for hourly forecasts</a:t>
+            </a:r>
+          </a:p>
+          <a:p>
+            <a:r>
+              <a:rPr lang="en-US" dirty="0"/>
+              <a:t>Use PCA for dimension reduction</a:t>
+            </a:r>
+          </a:p>
+          <a:p>
+            <a:r>
+              <a:rPr lang="en-US" dirty="0"/>
+              <a:t>Compare model with other multivariate forecasting models such as Neural Basis Expansion Analysis for interpretable Time Series (N-BEATS), Temporal Fusion Transformer or </a:t>
+            </a:r>
+            <a:r>
+              <a:rPr lang="en-US" b="0" i="0" u="none" strike="noStrike" dirty="0">
+                <a:solidFill>
+                  <a:srgbClr val="292929"/>
+                </a:solidFill>
+                <a:effectLst/>
+                <a:latin typeface="source-serif-pro"/>
+              </a:rPr>
+              <a:t>SARIMAX</a:t>
+            </a:r>
             <a:endParaRPr lang="en-US" dirty="0"/>
           </a:p>
         </p:txBody>
@@ -4335,7 +5541,7 @@
     </p:spTree>
     <p:extLst>
       <p:ext uri="{BB962C8B-B14F-4D97-AF65-F5344CB8AC3E}">
-        <p14:creationId xmlns:p14="http://schemas.microsoft.com/office/powerpoint/2010/main" val="1261115438"/>
+        <p14:creationId xmlns:p14="http://schemas.microsoft.com/office/powerpoint/2010/main" val="3315713905"/>
       </p:ext>
     </p:extLst>
   </p:cSld>
@@ -4367,7 +5573,7 @@
           <p:cNvPr id="2" name="Title 1">
             <a:extLst>
               <a:ext uri="{FF2B5EF4-FFF2-40B4-BE49-F238E27FC236}">
-                <a16:creationId xmlns:a16="http://schemas.microsoft.com/office/drawing/2014/main" id="{5E5BE2AE-2E10-F618-3140-5796F08DF3F8}"/>
+                <a16:creationId xmlns:a16="http://schemas.microsoft.com/office/drawing/2014/main" id="{5766D0D4-958D-2D0A-3F52-2A2009B43F39}"/>
               </a:ext>
             </a:extLst>
           </p:cNvPr>
@@ -4385,73 +5591,1363 @@
           <a:p>
             <a:r>
               <a:rPr lang="en-US" dirty="0"/>
-              <a:t>Data Before and After</a:t>
-            </a:r>
-          </a:p>
-        </p:txBody>
-      </p:sp>
-      <p:pic>
-        <p:nvPicPr>
-          <p:cNvPr id="7" name="Picture 6" descr="Chart, line chart&#10;&#10;Description automatically generated">
-            <a:extLst>
-              <a:ext uri="{FF2B5EF4-FFF2-40B4-BE49-F238E27FC236}">
-                <a16:creationId xmlns:a16="http://schemas.microsoft.com/office/drawing/2014/main" id="{89514D7D-A7B7-FEE3-DE63-7EE7ED43E17D}"/>
-              </a:ext>
-            </a:extLst>
-          </p:cNvPr>
-          <p:cNvPicPr>
-            <a:picLocks noChangeAspect="1"/>
-          </p:cNvPicPr>
-          <p:nvPr/>
-        </p:nvPicPr>
-        <p:blipFill rotWithShape="1">
-          <a:blip r:embed="rId2"/>
-          <a:srcRect l="9459" t="11660" r="12394" b="5381"/>
-          <a:stretch/>
-        </p:blipFill>
+              <a:t>Data Wrangling</a:t>
+            </a:r>
+          </a:p>
+        </p:txBody>
+      </p:sp>
+      <p:sp>
+        <p:nvSpPr>
+          <p:cNvPr id="3" name="Content Placeholder 2">
+            <a:extLst>
+              <a:ext uri="{FF2B5EF4-FFF2-40B4-BE49-F238E27FC236}">
+                <a16:creationId xmlns:a16="http://schemas.microsoft.com/office/drawing/2014/main" id="{1B98A978-49C1-D7C5-D77F-7120FAE8362F}"/>
+              </a:ext>
+            </a:extLst>
+          </p:cNvPr>
+          <p:cNvSpPr>
+            <a:spLocks noGrp="1"/>
+          </p:cNvSpPr>
+          <p:nvPr>
+            <p:ph idx="1"/>
+          </p:nvPr>
+        </p:nvSpPr>
         <p:spPr>
           <a:xfrm>
-            <a:off x="5528789" y="3901685"/>
-            <a:ext cx="6073796" cy="2531253"/>
+            <a:off x="838200" y="1825625"/>
+            <a:ext cx="10515600" cy="2182731"/>
+          </a:xfrm>
+        </p:spPr>
+        <p:txBody>
+          <a:bodyPr/>
+          <a:lstStyle/>
+          <a:p>
+            <a:r>
+              <a:rPr lang="en-US" dirty="0"/>
+              <a:t>Never trust data integrity </a:t>
+            </a:r>
+          </a:p>
+          <a:p>
+            <a:r>
+              <a:rPr lang="en-US" dirty="0"/>
+              <a:t>Find and correct missing values</a:t>
+            </a:r>
+          </a:p>
+          <a:p>
+            <a:r>
+              <a:rPr lang="en-US" dirty="0"/>
+              <a:t>Transformer Model requires particular data types</a:t>
+            </a:r>
+          </a:p>
+          <a:p>
+            <a:r>
+              <a:rPr lang="en-US" dirty="0"/>
+              <a:t>All data must be scaled prior to model generation</a:t>
+            </a:r>
+          </a:p>
+          <a:p>
+            <a:endParaRPr lang="en-US" dirty="0"/>
+          </a:p>
+          <a:p>
+            <a:endParaRPr lang="en-US" dirty="0"/>
+          </a:p>
+        </p:txBody>
+      </p:sp>
+      <p:sp>
+        <p:nvSpPr>
+          <p:cNvPr id="4" name="Rectangle 3">
+            <a:extLst>
+              <a:ext uri="{FF2B5EF4-FFF2-40B4-BE49-F238E27FC236}">
+                <a16:creationId xmlns:a16="http://schemas.microsoft.com/office/drawing/2014/main" id="{1A510039-BC41-D55D-63BE-08483EC020C1}"/>
+              </a:ext>
+            </a:extLst>
+          </p:cNvPr>
+          <p:cNvSpPr/>
+          <p:nvPr/>
+        </p:nvSpPr>
+        <p:spPr>
+          <a:xfrm>
+            <a:off x="1077186" y="3982391"/>
+            <a:ext cx="963260" cy="1207566"/>
           </a:xfrm>
           <a:prstGeom prst="rect">
             <a:avLst/>
           </a:prstGeom>
         </p:spPr>
-      </p:pic>
-      <p:pic>
-        <p:nvPicPr>
-          <p:cNvPr id="5" name="Picture 4" descr="A picture containing text&#10;&#10;Description automatically generated">
-            <a:extLst>
-              <a:ext uri="{FF2B5EF4-FFF2-40B4-BE49-F238E27FC236}">
-                <a16:creationId xmlns:a16="http://schemas.microsoft.com/office/drawing/2014/main" id="{2B4B2EFD-65C6-9BDA-ED70-657EAD8078A0}"/>
-              </a:ext>
-            </a:extLst>
-          </p:cNvPr>
-          <p:cNvPicPr>
-            <a:picLocks noChangeAspect="1"/>
-          </p:cNvPicPr>
+        <p:style>
+          <a:lnRef idx="1">
+            <a:schemeClr val="accent1"/>
+          </a:lnRef>
+          <a:fillRef idx="3">
+            <a:schemeClr val="accent1"/>
+          </a:fillRef>
+          <a:effectRef idx="2">
+            <a:schemeClr val="accent1"/>
+          </a:effectRef>
+          <a:fontRef idx="minor">
+            <a:schemeClr val="lt1"/>
+          </a:fontRef>
+        </p:style>
+        <p:txBody>
+          <a:bodyPr rtlCol="0" anchor="ctr"/>
+          <a:lstStyle/>
+          <a:p>
+            <a:pPr algn="ctr"/>
+            <a:r>
+              <a:rPr lang="en-US" dirty="0"/>
+              <a:t>Cleaned Data Set</a:t>
+            </a:r>
+          </a:p>
+        </p:txBody>
+      </p:sp>
+      <p:sp>
+        <p:nvSpPr>
+          <p:cNvPr id="5" name="Rectangle 4">
+            <a:extLst>
+              <a:ext uri="{FF2B5EF4-FFF2-40B4-BE49-F238E27FC236}">
+                <a16:creationId xmlns:a16="http://schemas.microsoft.com/office/drawing/2014/main" id="{D2630767-8C14-C7B5-DB8F-D506B2159563}"/>
+              </a:ext>
+            </a:extLst>
+          </p:cNvPr>
+          <p:cNvSpPr/>
           <p:nvPr/>
-        </p:nvPicPr>
-        <p:blipFill rotWithShape="1">
-          <a:blip r:embed="rId3"/>
-          <a:srcRect l="10265" t="10306" r="11589" b="6734"/>
-          <a:stretch/>
-        </p:blipFill>
+        </p:nvSpPr>
         <p:spPr>
           <a:xfrm>
-            <a:off x="419353" y="1690688"/>
-            <a:ext cx="6073796" cy="2531253"/>
+            <a:off x="4291179" y="4401861"/>
+            <a:ext cx="963260" cy="1207566"/>
           </a:xfrm>
           <a:prstGeom prst="rect">
             <a:avLst/>
           </a:prstGeom>
         </p:spPr>
-      </p:pic>
+        <p:style>
+          <a:lnRef idx="1">
+            <a:schemeClr val="accent1"/>
+          </a:lnRef>
+          <a:fillRef idx="3">
+            <a:schemeClr val="accent1"/>
+          </a:fillRef>
+          <a:effectRef idx="2">
+            <a:schemeClr val="accent1"/>
+          </a:effectRef>
+          <a:fontRef idx="minor">
+            <a:schemeClr val="lt1"/>
+          </a:fontRef>
+        </p:style>
+        <p:txBody>
+          <a:bodyPr rtlCol="0" anchor="ctr"/>
+          <a:lstStyle/>
+          <a:p>
+            <a:pPr algn="ctr"/>
+            <a:r>
+              <a:rPr lang="en-US" dirty="0"/>
+              <a:t>Scaling</a:t>
+            </a:r>
+          </a:p>
+        </p:txBody>
+      </p:sp>
+      <p:sp>
+        <p:nvSpPr>
+          <p:cNvPr id="7" name="Rectangle 6">
+            <a:extLst>
+              <a:ext uri="{FF2B5EF4-FFF2-40B4-BE49-F238E27FC236}">
+                <a16:creationId xmlns:a16="http://schemas.microsoft.com/office/drawing/2014/main" id="{89C43F9D-135A-F32F-3529-0B28C1C71749}"/>
+              </a:ext>
+            </a:extLst>
+          </p:cNvPr>
+          <p:cNvSpPr/>
+          <p:nvPr/>
+        </p:nvSpPr>
+        <p:spPr>
+          <a:xfrm>
+            <a:off x="7459369" y="4401861"/>
+            <a:ext cx="1514688" cy="448475"/>
+          </a:xfrm>
+          <a:prstGeom prst="rect">
+            <a:avLst/>
+          </a:prstGeom>
+        </p:spPr>
+        <p:style>
+          <a:lnRef idx="1">
+            <a:schemeClr val="accent1"/>
+          </a:lnRef>
+          <a:fillRef idx="3">
+            <a:schemeClr val="accent1"/>
+          </a:fillRef>
+          <a:effectRef idx="2">
+            <a:schemeClr val="accent1"/>
+          </a:effectRef>
+          <a:fontRef idx="minor">
+            <a:schemeClr val="lt1"/>
+          </a:fontRef>
+        </p:style>
+        <p:txBody>
+          <a:bodyPr rtlCol="0" anchor="ctr"/>
+          <a:lstStyle/>
+          <a:p>
+            <a:pPr algn="ctr"/>
+            <a:r>
+              <a:rPr lang="en-US" dirty="0"/>
+              <a:t>Testing</a:t>
+            </a:r>
+          </a:p>
+        </p:txBody>
+      </p:sp>
+      <p:sp>
+        <p:nvSpPr>
+          <p:cNvPr id="8" name="Rectangle 7">
+            <a:extLst>
+              <a:ext uri="{FF2B5EF4-FFF2-40B4-BE49-F238E27FC236}">
+                <a16:creationId xmlns:a16="http://schemas.microsoft.com/office/drawing/2014/main" id="{A089CC72-089C-EC07-7F10-5C5E52481344}"/>
+              </a:ext>
+            </a:extLst>
+          </p:cNvPr>
+          <p:cNvSpPr/>
+          <p:nvPr/>
+        </p:nvSpPr>
+        <p:spPr>
+          <a:xfrm>
+            <a:off x="5592180" y="4401861"/>
+            <a:ext cx="1514688" cy="448475"/>
+          </a:xfrm>
+          <a:prstGeom prst="rect">
+            <a:avLst/>
+          </a:prstGeom>
+        </p:spPr>
+        <p:style>
+          <a:lnRef idx="1">
+            <a:schemeClr val="accent1"/>
+          </a:lnRef>
+          <a:fillRef idx="3">
+            <a:schemeClr val="accent1"/>
+          </a:fillRef>
+          <a:effectRef idx="2">
+            <a:schemeClr val="accent1"/>
+          </a:effectRef>
+          <a:fontRef idx="minor">
+            <a:schemeClr val="lt1"/>
+          </a:fontRef>
+        </p:style>
+        <p:txBody>
+          <a:bodyPr rtlCol="0" anchor="ctr"/>
+          <a:lstStyle/>
+          <a:p>
+            <a:pPr algn="ctr"/>
+            <a:r>
+              <a:rPr lang="en-US" dirty="0"/>
+              <a:t>Training </a:t>
+            </a:r>
+          </a:p>
+        </p:txBody>
+      </p:sp>
+      <p:sp>
+        <p:nvSpPr>
+          <p:cNvPr id="9" name="Rectangle 8">
+            <a:extLst>
+              <a:ext uri="{FF2B5EF4-FFF2-40B4-BE49-F238E27FC236}">
+                <a16:creationId xmlns:a16="http://schemas.microsoft.com/office/drawing/2014/main" id="{385B65C1-9513-32E3-2187-92653FDF2951}"/>
+              </a:ext>
+            </a:extLst>
+          </p:cNvPr>
+          <p:cNvSpPr/>
+          <p:nvPr/>
+        </p:nvSpPr>
+        <p:spPr>
+          <a:xfrm>
+            <a:off x="5592179" y="5694979"/>
+            <a:ext cx="1514689" cy="617743"/>
+          </a:xfrm>
+          <a:prstGeom prst="rect">
+            <a:avLst/>
+          </a:prstGeom>
+        </p:spPr>
+        <p:style>
+          <a:lnRef idx="1">
+            <a:schemeClr val="accent1"/>
+          </a:lnRef>
+          <a:fillRef idx="3">
+            <a:schemeClr val="accent1"/>
+          </a:fillRef>
+          <a:effectRef idx="2">
+            <a:schemeClr val="accent1"/>
+          </a:effectRef>
+          <a:fontRef idx="minor">
+            <a:schemeClr val="lt1"/>
+          </a:fontRef>
+        </p:style>
+        <p:txBody>
+          <a:bodyPr rtlCol="0" anchor="ctr"/>
+          <a:lstStyle/>
+          <a:p>
+            <a:pPr algn="ctr"/>
+            <a:r>
+              <a:rPr lang="en-US" dirty="0"/>
+              <a:t>Transformer Model</a:t>
+            </a:r>
+          </a:p>
+        </p:txBody>
+      </p:sp>
+      <p:sp>
+        <p:nvSpPr>
+          <p:cNvPr id="10" name="Rectangle 9">
+            <a:extLst>
+              <a:ext uri="{FF2B5EF4-FFF2-40B4-BE49-F238E27FC236}">
+                <a16:creationId xmlns:a16="http://schemas.microsoft.com/office/drawing/2014/main" id="{AC252269-5F94-8C5F-838F-BBABDCE05338}"/>
+              </a:ext>
+            </a:extLst>
+          </p:cNvPr>
+          <p:cNvSpPr/>
+          <p:nvPr/>
+        </p:nvSpPr>
+        <p:spPr>
+          <a:xfrm>
+            <a:off x="7476182" y="5694157"/>
+            <a:ext cx="1493762" cy="617743"/>
+          </a:xfrm>
+          <a:prstGeom prst="rect">
+            <a:avLst/>
+          </a:prstGeom>
+        </p:spPr>
+        <p:style>
+          <a:lnRef idx="1">
+            <a:schemeClr val="accent1"/>
+          </a:lnRef>
+          <a:fillRef idx="3">
+            <a:schemeClr val="accent1"/>
+          </a:fillRef>
+          <a:effectRef idx="2">
+            <a:schemeClr val="accent1"/>
+          </a:effectRef>
+          <a:fontRef idx="minor">
+            <a:schemeClr val="lt1"/>
+          </a:fontRef>
+        </p:style>
+        <p:txBody>
+          <a:bodyPr rtlCol="0" anchor="ctr"/>
+          <a:lstStyle/>
+          <a:p>
+            <a:pPr algn="ctr"/>
+            <a:r>
+              <a:rPr lang="en-US" dirty="0"/>
+              <a:t>Model</a:t>
+            </a:r>
+          </a:p>
+        </p:txBody>
+      </p:sp>
+      <p:sp>
+        <p:nvSpPr>
+          <p:cNvPr id="11" name="Rectangle 10">
+            <a:extLst>
+              <a:ext uri="{FF2B5EF4-FFF2-40B4-BE49-F238E27FC236}">
+                <a16:creationId xmlns:a16="http://schemas.microsoft.com/office/drawing/2014/main" id="{7A0B804E-BD1E-DD2E-56A2-D09F9C4D0F2A}"/>
+              </a:ext>
+            </a:extLst>
+          </p:cNvPr>
+          <p:cNvSpPr/>
+          <p:nvPr/>
+        </p:nvSpPr>
+        <p:spPr>
+          <a:xfrm>
+            <a:off x="9831228" y="5694157"/>
+            <a:ext cx="1389051" cy="617743"/>
+          </a:xfrm>
+          <a:prstGeom prst="rect">
+            <a:avLst/>
+          </a:prstGeom>
+        </p:spPr>
+        <p:style>
+          <a:lnRef idx="1">
+            <a:schemeClr val="accent1"/>
+          </a:lnRef>
+          <a:fillRef idx="3">
+            <a:schemeClr val="accent1"/>
+          </a:fillRef>
+          <a:effectRef idx="2">
+            <a:schemeClr val="accent1"/>
+          </a:effectRef>
+          <a:fontRef idx="minor">
+            <a:schemeClr val="lt1"/>
+          </a:fontRef>
+        </p:style>
+        <p:txBody>
+          <a:bodyPr rtlCol="0" anchor="ctr"/>
+          <a:lstStyle/>
+          <a:p>
+            <a:pPr algn="ctr"/>
+            <a:r>
+              <a:rPr lang="en-US" dirty="0"/>
+              <a:t>Evaluation</a:t>
+            </a:r>
+          </a:p>
+        </p:txBody>
+      </p:sp>
+      <p:cxnSp>
+        <p:nvCxnSpPr>
+          <p:cNvPr id="12" name="Elbow Connector 11">
+            <a:extLst>
+              <a:ext uri="{FF2B5EF4-FFF2-40B4-BE49-F238E27FC236}">
+                <a16:creationId xmlns:a16="http://schemas.microsoft.com/office/drawing/2014/main" id="{FC1BE035-23B4-60C7-711B-50A687D79360}"/>
+              </a:ext>
+            </a:extLst>
+          </p:cNvPr>
+          <p:cNvCxnSpPr>
+            <a:cxnSpLocks/>
+            <a:stCxn id="5" idx="0"/>
+            <a:endCxn id="8" idx="0"/>
+          </p:cNvCxnSpPr>
+          <p:nvPr/>
+        </p:nvCxnSpPr>
+        <p:spPr>
+          <a:xfrm rot="5400000" flipH="1" flipV="1">
+            <a:off x="5561166" y="3613504"/>
+            <a:ext cx="12700" cy="1576715"/>
+          </a:xfrm>
+          <a:prstGeom prst="bentConnector3">
+            <a:avLst>
+              <a:gd name="adj1" fmla="val 1800000"/>
+            </a:avLst>
+          </a:prstGeom>
+          <a:ln>
+            <a:tailEnd type="triangle"/>
+          </a:ln>
+        </p:spPr>
+        <p:style>
+          <a:lnRef idx="2">
+            <a:schemeClr val="dk1"/>
+          </a:lnRef>
+          <a:fillRef idx="0">
+            <a:schemeClr val="dk1"/>
+          </a:fillRef>
+          <a:effectRef idx="1">
+            <a:schemeClr val="dk1"/>
+          </a:effectRef>
+          <a:fontRef idx="minor">
+            <a:schemeClr val="tx1"/>
+          </a:fontRef>
+        </p:style>
+      </p:cxnSp>
+      <p:cxnSp>
+        <p:nvCxnSpPr>
+          <p:cNvPr id="13" name="Elbow Connector 12">
+            <a:extLst>
+              <a:ext uri="{FF2B5EF4-FFF2-40B4-BE49-F238E27FC236}">
+                <a16:creationId xmlns:a16="http://schemas.microsoft.com/office/drawing/2014/main" id="{65AACACE-9638-4CEB-4FED-F7191D6CF38C}"/>
+              </a:ext>
+            </a:extLst>
+          </p:cNvPr>
+          <p:cNvCxnSpPr>
+            <a:cxnSpLocks/>
+            <a:stCxn id="5" idx="0"/>
+            <a:endCxn id="7" idx="0"/>
+          </p:cNvCxnSpPr>
+          <p:nvPr/>
+        </p:nvCxnSpPr>
+        <p:spPr>
+          <a:xfrm rot="5400000" flipH="1" flipV="1">
+            <a:off x="6494761" y="2679909"/>
+            <a:ext cx="12700" cy="3443904"/>
+          </a:xfrm>
+          <a:prstGeom prst="bentConnector3">
+            <a:avLst>
+              <a:gd name="adj1" fmla="val 1800000"/>
+            </a:avLst>
+          </a:prstGeom>
+          <a:ln>
+            <a:tailEnd type="triangle"/>
+          </a:ln>
+        </p:spPr>
+        <p:style>
+          <a:lnRef idx="2">
+            <a:schemeClr val="dk1"/>
+          </a:lnRef>
+          <a:fillRef idx="0">
+            <a:schemeClr val="dk1"/>
+          </a:fillRef>
+          <a:effectRef idx="1">
+            <a:schemeClr val="dk1"/>
+          </a:effectRef>
+          <a:fontRef idx="minor">
+            <a:schemeClr val="tx1"/>
+          </a:fontRef>
+        </p:style>
+      </p:cxnSp>
+      <p:cxnSp>
+        <p:nvCxnSpPr>
+          <p:cNvPr id="14" name="Straight Arrow Connector 13">
+            <a:extLst>
+              <a:ext uri="{FF2B5EF4-FFF2-40B4-BE49-F238E27FC236}">
+                <a16:creationId xmlns:a16="http://schemas.microsoft.com/office/drawing/2014/main" id="{33C89E8A-A6EB-3E26-1523-8FBCFFEEBF04}"/>
+              </a:ext>
+            </a:extLst>
+          </p:cNvPr>
+          <p:cNvCxnSpPr>
+            <a:cxnSpLocks/>
+          </p:cNvCxnSpPr>
+          <p:nvPr/>
+        </p:nvCxnSpPr>
+        <p:spPr>
+          <a:xfrm>
+            <a:off x="5825066" y="4850336"/>
+            <a:ext cx="0" cy="843821"/>
+          </a:xfrm>
+          <a:prstGeom prst="straightConnector1">
+            <a:avLst/>
+          </a:prstGeom>
+          <a:ln>
+            <a:tailEnd type="triangle"/>
+          </a:ln>
+        </p:spPr>
+        <p:style>
+          <a:lnRef idx="2">
+            <a:schemeClr val="dk1"/>
+          </a:lnRef>
+          <a:fillRef idx="0">
+            <a:schemeClr val="dk1"/>
+          </a:fillRef>
+          <a:effectRef idx="1">
+            <a:schemeClr val="dk1"/>
+          </a:effectRef>
+          <a:fontRef idx="minor">
+            <a:schemeClr val="tx1"/>
+          </a:fontRef>
+        </p:style>
+      </p:cxnSp>
+      <p:cxnSp>
+        <p:nvCxnSpPr>
+          <p:cNvPr id="15" name="Straight Arrow Connector 14">
+            <a:extLst>
+              <a:ext uri="{FF2B5EF4-FFF2-40B4-BE49-F238E27FC236}">
+                <a16:creationId xmlns:a16="http://schemas.microsoft.com/office/drawing/2014/main" id="{6C5A704F-8EEC-4E83-2A87-0EB60F13B47F}"/>
+              </a:ext>
+            </a:extLst>
+          </p:cNvPr>
+          <p:cNvCxnSpPr>
+            <a:cxnSpLocks/>
+            <a:stCxn id="7" idx="2"/>
+            <a:endCxn id="10" idx="0"/>
+          </p:cNvCxnSpPr>
+          <p:nvPr/>
+        </p:nvCxnSpPr>
+        <p:spPr>
+          <a:xfrm>
+            <a:off x="8216713" y="4850336"/>
+            <a:ext cx="6350" cy="843821"/>
+          </a:xfrm>
+          <a:prstGeom prst="straightConnector1">
+            <a:avLst/>
+          </a:prstGeom>
+          <a:ln>
+            <a:tailEnd type="triangle"/>
+          </a:ln>
+        </p:spPr>
+        <p:style>
+          <a:lnRef idx="2">
+            <a:schemeClr val="dk1"/>
+          </a:lnRef>
+          <a:fillRef idx="0">
+            <a:schemeClr val="dk1"/>
+          </a:fillRef>
+          <a:effectRef idx="1">
+            <a:schemeClr val="dk1"/>
+          </a:effectRef>
+          <a:fontRef idx="minor">
+            <a:schemeClr val="tx1"/>
+          </a:fontRef>
+        </p:style>
+      </p:cxnSp>
+      <p:cxnSp>
+        <p:nvCxnSpPr>
+          <p:cNvPr id="17" name="Elbow Connector 16">
+            <a:extLst>
+              <a:ext uri="{FF2B5EF4-FFF2-40B4-BE49-F238E27FC236}">
+                <a16:creationId xmlns:a16="http://schemas.microsoft.com/office/drawing/2014/main" id="{A142C36A-0A85-3C8A-557D-3C8D4CC8A8EC}"/>
+              </a:ext>
+            </a:extLst>
+          </p:cNvPr>
+          <p:cNvCxnSpPr>
+            <a:cxnSpLocks/>
+            <a:stCxn id="7" idx="3"/>
+            <a:endCxn id="11" idx="0"/>
+          </p:cNvCxnSpPr>
+          <p:nvPr/>
+        </p:nvCxnSpPr>
+        <p:spPr>
+          <a:xfrm>
+            <a:off x="8974057" y="4626099"/>
+            <a:ext cx="1551697" cy="1068058"/>
+          </a:xfrm>
+          <a:prstGeom prst="bentConnector2">
+            <a:avLst/>
+          </a:prstGeom>
+          <a:ln>
+            <a:tailEnd type="triangle"/>
+          </a:ln>
+        </p:spPr>
+        <p:style>
+          <a:lnRef idx="2">
+            <a:schemeClr val="dk1"/>
+          </a:lnRef>
+          <a:fillRef idx="0">
+            <a:schemeClr val="dk1"/>
+          </a:fillRef>
+          <a:effectRef idx="1">
+            <a:schemeClr val="dk1"/>
+          </a:effectRef>
+          <a:fontRef idx="minor">
+            <a:schemeClr val="tx1"/>
+          </a:fontRef>
+        </p:style>
+      </p:cxnSp>
+      <p:cxnSp>
+        <p:nvCxnSpPr>
+          <p:cNvPr id="18" name="Straight Arrow Connector 17">
+            <a:extLst>
+              <a:ext uri="{FF2B5EF4-FFF2-40B4-BE49-F238E27FC236}">
+                <a16:creationId xmlns:a16="http://schemas.microsoft.com/office/drawing/2014/main" id="{642A4A1F-5657-B79A-17BD-7CDD06BC9C1F}"/>
+              </a:ext>
+            </a:extLst>
+          </p:cNvPr>
+          <p:cNvCxnSpPr>
+            <a:cxnSpLocks/>
+            <a:stCxn id="10" idx="3"/>
+            <a:endCxn id="11" idx="1"/>
+          </p:cNvCxnSpPr>
+          <p:nvPr/>
+        </p:nvCxnSpPr>
+        <p:spPr>
+          <a:xfrm>
+            <a:off x="8969944" y="6003029"/>
+            <a:ext cx="861284" cy="0"/>
+          </a:xfrm>
+          <a:prstGeom prst="straightConnector1">
+            <a:avLst/>
+          </a:prstGeom>
+          <a:ln>
+            <a:tailEnd type="triangle"/>
+          </a:ln>
+        </p:spPr>
+        <p:style>
+          <a:lnRef idx="2">
+            <a:schemeClr val="dk1"/>
+          </a:lnRef>
+          <a:fillRef idx="0">
+            <a:schemeClr val="dk1"/>
+          </a:fillRef>
+          <a:effectRef idx="1">
+            <a:schemeClr val="dk1"/>
+          </a:effectRef>
+          <a:fontRef idx="minor">
+            <a:schemeClr val="tx1"/>
+          </a:fontRef>
+        </p:style>
+      </p:cxnSp>
+      <p:cxnSp>
+        <p:nvCxnSpPr>
+          <p:cNvPr id="19" name="Straight Arrow Connector 18">
+            <a:extLst>
+              <a:ext uri="{FF2B5EF4-FFF2-40B4-BE49-F238E27FC236}">
+                <a16:creationId xmlns:a16="http://schemas.microsoft.com/office/drawing/2014/main" id="{079704C1-B0CF-740D-92E1-22F87BAD2A3B}"/>
+              </a:ext>
+            </a:extLst>
+          </p:cNvPr>
+          <p:cNvCxnSpPr>
+            <a:cxnSpLocks/>
+            <a:stCxn id="9" idx="3"/>
+            <a:endCxn id="10" idx="1"/>
+          </p:cNvCxnSpPr>
+          <p:nvPr/>
+        </p:nvCxnSpPr>
+        <p:spPr>
+          <a:xfrm flipV="1">
+            <a:off x="7106868" y="6003029"/>
+            <a:ext cx="369314" cy="822"/>
+          </a:xfrm>
+          <a:prstGeom prst="straightConnector1">
+            <a:avLst/>
+          </a:prstGeom>
+          <a:ln>
+            <a:tailEnd type="triangle"/>
+          </a:ln>
+        </p:spPr>
+        <p:style>
+          <a:lnRef idx="2">
+            <a:schemeClr val="dk1"/>
+          </a:lnRef>
+          <a:fillRef idx="0">
+            <a:schemeClr val="dk1"/>
+          </a:fillRef>
+          <a:effectRef idx="1">
+            <a:schemeClr val="dk1"/>
+          </a:effectRef>
+          <a:fontRef idx="minor">
+            <a:schemeClr val="tx1"/>
+          </a:fontRef>
+        </p:style>
+      </p:cxnSp>
+      <p:sp>
+        <p:nvSpPr>
+          <p:cNvPr id="20" name="TextBox 19">
+            <a:extLst>
+              <a:ext uri="{FF2B5EF4-FFF2-40B4-BE49-F238E27FC236}">
+                <a16:creationId xmlns:a16="http://schemas.microsoft.com/office/drawing/2014/main" id="{9745B1EF-F955-CC2E-BF62-3CF66B11F047}"/>
+              </a:ext>
+            </a:extLst>
+          </p:cNvPr>
+          <p:cNvSpPr txBox="1"/>
+          <p:nvPr/>
+        </p:nvSpPr>
+        <p:spPr>
+          <a:xfrm>
+            <a:off x="9279118" y="4375481"/>
+            <a:ext cx="778927" cy="525400"/>
+          </a:xfrm>
+          <a:prstGeom prst="rect">
+            <a:avLst/>
+          </a:prstGeom>
+          <a:noFill/>
+        </p:spPr>
+        <p:txBody>
+          <a:bodyPr wrap="square" rtlCol="0">
+            <a:spAutoFit/>
+          </a:bodyPr>
+          <a:lstStyle/>
+          <a:p>
+            <a:pPr algn="ctr"/>
+            <a:r>
+              <a:rPr lang="en-US" sz="1200" dirty="0"/>
+              <a:t>Actual</a:t>
+            </a:r>
+          </a:p>
+          <a:p>
+            <a:pPr algn="ctr">
+              <a:lnSpc>
+                <a:spcPct val="150000"/>
+              </a:lnSpc>
+            </a:pPr>
+            <a:r>
+              <a:rPr lang="en-US" sz="1200" dirty="0"/>
+              <a:t>Values</a:t>
+            </a:r>
+          </a:p>
+        </p:txBody>
+      </p:sp>
+      <p:sp>
+        <p:nvSpPr>
+          <p:cNvPr id="21" name="TextBox 20">
+            <a:extLst>
+              <a:ext uri="{FF2B5EF4-FFF2-40B4-BE49-F238E27FC236}">
+                <a16:creationId xmlns:a16="http://schemas.microsoft.com/office/drawing/2014/main" id="{4A35F124-EA17-9272-A12E-8E449F77736E}"/>
+              </a:ext>
+            </a:extLst>
+          </p:cNvPr>
+          <p:cNvSpPr txBox="1"/>
+          <p:nvPr/>
+        </p:nvSpPr>
+        <p:spPr>
+          <a:xfrm>
+            <a:off x="9021344" y="5748867"/>
+            <a:ext cx="778927" cy="525400"/>
+          </a:xfrm>
+          <a:prstGeom prst="rect">
+            <a:avLst/>
+          </a:prstGeom>
+          <a:noFill/>
+        </p:spPr>
+        <p:txBody>
+          <a:bodyPr wrap="square" rtlCol="0">
+            <a:spAutoFit/>
+          </a:bodyPr>
+          <a:lstStyle/>
+          <a:p>
+            <a:r>
+              <a:rPr lang="en-US" sz="1200" dirty="0"/>
+              <a:t>Predicted</a:t>
+            </a:r>
+          </a:p>
+          <a:p>
+            <a:pPr algn="ctr">
+              <a:lnSpc>
+                <a:spcPct val="150000"/>
+              </a:lnSpc>
+            </a:pPr>
+            <a:r>
+              <a:rPr lang="en-US" sz="1200" dirty="0"/>
+              <a:t>Values</a:t>
+            </a:r>
+          </a:p>
+        </p:txBody>
+      </p:sp>
+      <p:sp>
+        <p:nvSpPr>
+          <p:cNvPr id="27" name="TextBox 26">
+            <a:extLst>
+              <a:ext uri="{FF2B5EF4-FFF2-40B4-BE49-F238E27FC236}">
+                <a16:creationId xmlns:a16="http://schemas.microsoft.com/office/drawing/2014/main" id="{2E3D0FC8-A743-E94D-D88D-87348303F3C0}"/>
+              </a:ext>
+            </a:extLst>
+          </p:cNvPr>
+          <p:cNvSpPr txBox="1"/>
+          <p:nvPr/>
+        </p:nvSpPr>
+        <p:spPr>
+          <a:xfrm rot="5400000">
+            <a:off x="5588633" y="5151845"/>
+            <a:ext cx="778927" cy="276999"/>
+          </a:xfrm>
+          <a:prstGeom prst="rect">
+            <a:avLst/>
+          </a:prstGeom>
+          <a:noFill/>
+        </p:spPr>
+        <p:txBody>
+          <a:bodyPr wrap="square" rtlCol="0">
+            <a:spAutoFit/>
+          </a:bodyPr>
+          <a:lstStyle/>
+          <a:p>
+            <a:r>
+              <a:rPr lang="en-US" sz="1200" dirty="0"/>
+              <a:t>Features </a:t>
+            </a:r>
+          </a:p>
+        </p:txBody>
+      </p:sp>
+      <p:cxnSp>
+        <p:nvCxnSpPr>
+          <p:cNvPr id="28" name="Straight Arrow Connector 27">
+            <a:extLst>
+              <a:ext uri="{FF2B5EF4-FFF2-40B4-BE49-F238E27FC236}">
+                <a16:creationId xmlns:a16="http://schemas.microsoft.com/office/drawing/2014/main" id="{3499D3DF-2680-5F61-C207-55219F464DD5}"/>
+              </a:ext>
+            </a:extLst>
+          </p:cNvPr>
+          <p:cNvCxnSpPr>
+            <a:cxnSpLocks/>
+            <a:stCxn id="8" idx="2"/>
+            <a:endCxn id="9" idx="0"/>
+          </p:cNvCxnSpPr>
+          <p:nvPr/>
+        </p:nvCxnSpPr>
+        <p:spPr>
+          <a:xfrm>
+            <a:off x="6349524" y="4850336"/>
+            <a:ext cx="0" cy="844643"/>
+          </a:xfrm>
+          <a:prstGeom prst="straightConnector1">
+            <a:avLst/>
+          </a:prstGeom>
+          <a:ln>
+            <a:tailEnd type="triangle"/>
+          </a:ln>
+        </p:spPr>
+        <p:style>
+          <a:lnRef idx="2">
+            <a:schemeClr val="dk1"/>
+          </a:lnRef>
+          <a:fillRef idx="0">
+            <a:schemeClr val="dk1"/>
+          </a:fillRef>
+          <a:effectRef idx="1">
+            <a:schemeClr val="dk1"/>
+          </a:effectRef>
+          <a:fontRef idx="minor">
+            <a:schemeClr val="tx1"/>
+          </a:fontRef>
+        </p:style>
+      </p:cxnSp>
+      <p:sp>
+        <p:nvSpPr>
+          <p:cNvPr id="29" name="TextBox 28">
+            <a:extLst>
+              <a:ext uri="{FF2B5EF4-FFF2-40B4-BE49-F238E27FC236}">
+                <a16:creationId xmlns:a16="http://schemas.microsoft.com/office/drawing/2014/main" id="{3DE77382-C105-136C-BFE0-40847DC19933}"/>
+              </a:ext>
+            </a:extLst>
+          </p:cNvPr>
+          <p:cNvSpPr txBox="1"/>
+          <p:nvPr/>
+        </p:nvSpPr>
+        <p:spPr>
+          <a:xfrm rot="5400000">
+            <a:off x="6054448" y="5159538"/>
+            <a:ext cx="778927" cy="261610"/>
+          </a:xfrm>
+          <a:prstGeom prst="rect">
+            <a:avLst/>
+          </a:prstGeom>
+          <a:noFill/>
+        </p:spPr>
+        <p:txBody>
+          <a:bodyPr wrap="square" rtlCol="0">
+            <a:spAutoFit/>
+          </a:bodyPr>
+          <a:lstStyle/>
+          <a:p>
+            <a:r>
+              <a:rPr lang="en-US" sz="1100" dirty="0"/>
+              <a:t>Covariates </a:t>
+            </a:r>
+          </a:p>
+        </p:txBody>
+      </p:sp>
+      <p:cxnSp>
+        <p:nvCxnSpPr>
+          <p:cNvPr id="30" name="Straight Arrow Connector 29">
+            <a:extLst>
+              <a:ext uri="{FF2B5EF4-FFF2-40B4-BE49-F238E27FC236}">
+                <a16:creationId xmlns:a16="http://schemas.microsoft.com/office/drawing/2014/main" id="{FBD3FA1A-01C4-4D1E-800C-B0ED92C8A8D0}"/>
+              </a:ext>
+            </a:extLst>
+          </p:cNvPr>
+          <p:cNvCxnSpPr>
+            <a:cxnSpLocks/>
+          </p:cNvCxnSpPr>
+          <p:nvPr/>
+        </p:nvCxnSpPr>
+        <p:spPr>
+          <a:xfrm>
+            <a:off x="6830462" y="4850336"/>
+            <a:ext cx="0" cy="843821"/>
+          </a:xfrm>
+          <a:prstGeom prst="straightConnector1">
+            <a:avLst/>
+          </a:prstGeom>
+          <a:ln>
+            <a:tailEnd type="triangle"/>
+          </a:ln>
+        </p:spPr>
+        <p:style>
+          <a:lnRef idx="2">
+            <a:schemeClr val="dk1"/>
+          </a:lnRef>
+          <a:fillRef idx="0">
+            <a:schemeClr val="dk1"/>
+          </a:fillRef>
+          <a:effectRef idx="1">
+            <a:schemeClr val="dk1"/>
+          </a:effectRef>
+          <a:fontRef idx="minor">
+            <a:schemeClr val="tx1"/>
+          </a:fontRef>
+        </p:style>
+      </p:cxnSp>
+      <p:sp>
+        <p:nvSpPr>
+          <p:cNvPr id="31" name="TextBox 30">
+            <a:extLst>
+              <a:ext uri="{FF2B5EF4-FFF2-40B4-BE49-F238E27FC236}">
+                <a16:creationId xmlns:a16="http://schemas.microsoft.com/office/drawing/2014/main" id="{5BA2994B-B47E-7FCB-1D1B-59411FEBCF7F}"/>
+              </a:ext>
+            </a:extLst>
+          </p:cNvPr>
+          <p:cNvSpPr txBox="1"/>
+          <p:nvPr/>
+        </p:nvSpPr>
+        <p:spPr>
+          <a:xfrm rot="5400000">
+            <a:off x="6579498" y="5166605"/>
+            <a:ext cx="778927" cy="276999"/>
+          </a:xfrm>
+          <a:prstGeom prst="rect">
+            <a:avLst/>
+          </a:prstGeom>
+          <a:noFill/>
+        </p:spPr>
+        <p:txBody>
+          <a:bodyPr wrap="square" rtlCol="0">
+            <a:spAutoFit/>
+          </a:bodyPr>
+          <a:lstStyle/>
+          <a:p>
+            <a:r>
+              <a:rPr lang="en-US" sz="1200" dirty="0"/>
+              <a:t>Predictor </a:t>
+            </a:r>
+          </a:p>
+        </p:txBody>
+      </p:sp>
+      <p:cxnSp>
+        <p:nvCxnSpPr>
+          <p:cNvPr id="37" name="Straight Arrow Connector 36">
+            <a:extLst>
+              <a:ext uri="{FF2B5EF4-FFF2-40B4-BE49-F238E27FC236}">
+                <a16:creationId xmlns:a16="http://schemas.microsoft.com/office/drawing/2014/main" id="{E54863D0-F4AC-3C36-F7F2-DEE34B7AD100}"/>
+              </a:ext>
+            </a:extLst>
+          </p:cNvPr>
+          <p:cNvCxnSpPr>
+            <a:cxnSpLocks/>
+          </p:cNvCxnSpPr>
+          <p:nvPr/>
+        </p:nvCxnSpPr>
+        <p:spPr>
+          <a:xfrm>
+            <a:off x="7753062" y="4868432"/>
+            <a:ext cx="0" cy="843821"/>
+          </a:xfrm>
+          <a:prstGeom prst="straightConnector1">
+            <a:avLst/>
+          </a:prstGeom>
+          <a:ln>
+            <a:tailEnd type="triangle"/>
+          </a:ln>
+        </p:spPr>
+        <p:style>
+          <a:lnRef idx="2">
+            <a:schemeClr val="dk1"/>
+          </a:lnRef>
+          <a:fillRef idx="0">
+            <a:schemeClr val="dk1"/>
+          </a:fillRef>
+          <a:effectRef idx="1">
+            <a:schemeClr val="dk1"/>
+          </a:effectRef>
+          <a:fontRef idx="minor">
+            <a:schemeClr val="tx1"/>
+          </a:fontRef>
+        </p:style>
+      </p:cxnSp>
+      <p:sp>
+        <p:nvSpPr>
+          <p:cNvPr id="38" name="TextBox 37">
+            <a:extLst>
+              <a:ext uri="{FF2B5EF4-FFF2-40B4-BE49-F238E27FC236}">
+                <a16:creationId xmlns:a16="http://schemas.microsoft.com/office/drawing/2014/main" id="{F96E3B71-514A-2710-15CB-DE211AC4AF80}"/>
+              </a:ext>
+            </a:extLst>
+          </p:cNvPr>
+          <p:cNvSpPr txBox="1"/>
+          <p:nvPr/>
+        </p:nvSpPr>
+        <p:spPr>
+          <a:xfrm rot="5400000">
+            <a:off x="7502099" y="5143379"/>
+            <a:ext cx="778927" cy="276999"/>
+          </a:xfrm>
+          <a:prstGeom prst="rect">
+            <a:avLst/>
+          </a:prstGeom>
+          <a:noFill/>
+        </p:spPr>
+        <p:txBody>
+          <a:bodyPr wrap="square" rtlCol="0">
+            <a:spAutoFit/>
+          </a:bodyPr>
+          <a:lstStyle/>
+          <a:p>
+            <a:r>
+              <a:rPr lang="en-US" sz="1200" dirty="0"/>
+              <a:t>Features </a:t>
+            </a:r>
+          </a:p>
+        </p:txBody>
+      </p:sp>
+      <p:sp>
+        <p:nvSpPr>
+          <p:cNvPr id="39" name="TextBox 38">
+            <a:extLst>
+              <a:ext uri="{FF2B5EF4-FFF2-40B4-BE49-F238E27FC236}">
+                <a16:creationId xmlns:a16="http://schemas.microsoft.com/office/drawing/2014/main" id="{60D1EB18-8A7B-1DC9-5233-FEFCDD7F340E}"/>
+              </a:ext>
+            </a:extLst>
+          </p:cNvPr>
+          <p:cNvSpPr txBox="1"/>
+          <p:nvPr/>
+        </p:nvSpPr>
+        <p:spPr>
+          <a:xfrm rot="5400000">
+            <a:off x="7967914" y="5151072"/>
+            <a:ext cx="778927" cy="261610"/>
+          </a:xfrm>
+          <a:prstGeom prst="rect">
+            <a:avLst/>
+          </a:prstGeom>
+          <a:noFill/>
+        </p:spPr>
+        <p:txBody>
+          <a:bodyPr wrap="square" rtlCol="0">
+            <a:spAutoFit/>
+          </a:bodyPr>
+          <a:lstStyle/>
+          <a:p>
+            <a:r>
+              <a:rPr lang="en-US" sz="1100" dirty="0"/>
+              <a:t>Covariates </a:t>
+            </a:r>
+          </a:p>
+        </p:txBody>
+      </p:sp>
+      <p:sp>
+        <p:nvSpPr>
+          <p:cNvPr id="45" name="Rectangle 44">
+            <a:extLst>
+              <a:ext uri="{FF2B5EF4-FFF2-40B4-BE49-F238E27FC236}">
+                <a16:creationId xmlns:a16="http://schemas.microsoft.com/office/drawing/2014/main" id="{3A3E5FBB-C0C0-FCA2-1F79-BB581F5AE03A}"/>
+              </a:ext>
+            </a:extLst>
+          </p:cNvPr>
+          <p:cNvSpPr/>
+          <p:nvPr/>
+        </p:nvSpPr>
+        <p:spPr>
+          <a:xfrm>
+            <a:off x="2841918" y="4408211"/>
+            <a:ext cx="963260" cy="1207566"/>
+          </a:xfrm>
+          <a:prstGeom prst="rect">
+            <a:avLst/>
+          </a:prstGeom>
+        </p:spPr>
+        <p:style>
+          <a:lnRef idx="1">
+            <a:schemeClr val="accent1"/>
+          </a:lnRef>
+          <a:fillRef idx="3">
+            <a:schemeClr val="accent1"/>
+          </a:fillRef>
+          <a:effectRef idx="2">
+            <a:schemeClr val="accent1"/>
+          </a:effectRef>
+          <a:fontRef idx="minor">
+            <a:schemeClr val="lt1"/>
+          </a:fontRef>
+        </p:style>
+        <p:txBody>
+          <a:bodyPr rtlCol="0" anchor="ctr"/>
+          <a:lstStyle/>
+          <a:p>
+            <a:pPr algn="ctr"/>
+            <a:r>
+              <a:rPr lang="en-US" dirty="0"/>
+              <a:t>Testing Training Split</a:t>
+            </a:r>
+          </a:p>
+        </p:txBody>
+      </p:sp>
+      <p:sp>
+        <p:nvSpPr>
+          <p:cNvPr id="47" name="Rectangle 46">
+            <a:extLst>
+              <a:ext uri="{FF2B5EF4-FFF2-40B4-BE49-F238E27FC236}">
+                <a16:creationId xmlns:a16="http://schemas.microsoft.com/office/drawing/2014/main" id="{B3C00372-042E-43BA-41D7-060DFC554285}"/>
+              </a:ext>
+            </a:extLst>
+          </p:cNvPr>
+          <p:cNvSpPr/>
+          <p:nvPr/>
+        </p:nvSpPr>
+        <p:spPr>
+          <a:xfrm>
+            <a:off x="1078191" y="5399246"/>
+            <a:ext cx="963260" cy="1207566"/>
+          </a:xfrm>
+          <a:prstGeom prst="rect">
+            <a:avLst/>
+          </a:prstGeom>
+        </p:spPr>
+        <p:style>
+          <a:lnRef idx="1">
+            <a:schemeClr val="accent1"/>
+          </a:lnRef>
+          <a:fillRef idx="3">
+            <a:schemeClr val="accent1"/>
+          </a:fillRef>
+          <a:effectRef idx="2">
+            <a:schemeClr val="accent1"/>
+          </a:effectRef>
+          <a:fontRef idx="minor">
+            <a:schemeClr val="lt1"/>
+          </a:fontRef>
+        </p:style>
+        <p:txBody>
+          <a:bodyPr rtlCol="0" anchor="ctr"/>
+          <a:lstStyle/>
+          <a:p>
+            <a:pPr algn="ctr"/>
+            <a:r>
+              <a:rPr lang="en-US" sz="1400" dirty="0"/>
+              <a:t>Covariates</a:t>
+            </a:r>
+          </a:p>
+        </p:txBody>
+      </p:sp>
+      <p:cxnSp>
+        <p:nvCxnSpPr>
+          <p:cNvPr id="48" name="Straight Arrow Connector 47">
+            <a:extLst>
+              <a:ext uri="{FF2B5EF4-FFF2-40B4-BE49-F238E27FC236}">
+                <a16:creationId xmlns:a16="http://schemas.microsoft.com/office/drawing/2014/main" id="{9724F849-6E67-99BD-2FEE-EC5846CD37B0}"/>
+              </a:ext>
+            </a:extLst>
+          </p:cNvPr>
+          <p:cNvCxnSpPr>
+            <a:cxnSpLocks/>
+            <a:stCxn id="4" idx="2"/>
+            <a:endCxn id="47" idx="0"/>
+          </p:cNvCxnSpPr>
+          <p:nvPr/>
+        </p:nvCxnSpPr>
+        <p:spPr>
+          <a:xfrm>
+            <a:off x="1558816" y="5189957"/>
+            <a:ext cx="1005" cy="209289"/>
+          </a:xfrm>
+          <a:prstGeom prst="straightConnector1">
+            <a:avLst/>
+          </a:prstGeom>
+          <a:ln>
+            <a:tailEnd type="triangle"/>
+          </a:ln>
+        </p:spPr>
+        <p:style>
+          <a:lnRef idx="2">
+            <a:schemeClr val="dk1"/>
+          </a:lnRef>
+          <a:fillRef idx="0">
+            <a:schemeClr val="dk1"/>
+          </a:fillRef>
+          <a:effectRef idx="1">
+            <a:schemeClr val="dk1"/>
+          </a:effectRef>
+          <a:fontRef idx="minor">
+            <a:schemeClr val="tx1"/>
+          </a:fontRef>
+        </p:style>
+      </p:cxnSp>
+      <p:cxnSp>
+        <p:nvCxnSpPr>
+          <p:cNvPr id="55" name="Straight Arrow Connector 54">
+            <a:extLst>
+              <a:ext uri="{FF2B5EF4-FFF2-40B4-BE49-F238E27FC236}">
+                <a16:creationId xmlns:a16="http://schemas.microsoft.com/office/drawing/2014/main" id="{7DE29956-728A-1A75-9269-BBA857A9DA5C}"/>
+              </a:ext>
+            </a:extLst>
+          </p:cNvPr>
+          <p:cNvCxnSpPr>
+            <a:cxnSpLocks/>
+            <a:stCxn id="45" idx="3"/>
+            <a:endCxn id="5" idx="1"/>
+          </p:cNvCxnSpPr>
+          <p:nvPr/>
+        </p:nvCxnSpPr>
+        <p:spPr>
+          <a:xfrm flipV="1">
+            <a:off x="3805178" y="5005644"/>
+            <a:ext cx="486001" cy="6350"/>
+          </a:xfrm>
+          <a:prstGeom prst="straightConnector1">
+            <a:avLst/>
+          </a:prstGeom>
+          <a:ln>
+            <a:tailEnd type="triangle"/>
+          </a:ln>
+        </p:spPr>
+        <p:style>
+          <a:lnRef idx="2">
+            <a:schemeClr val="dk1"/>
+          </a:lnRef>
+          <a:fillRef idx="0">
+            <a:schemeClr val="dk1"/>
+          </a:fillRef>
+          <a:effectRef idx="1">
+            <a:schemeClr val="dk1"/>
+          </a:effectRef>
+          <a:fontRef idx="minor">
+            <a:schemeClr val="tx1"/>
+          </a:fontRef>
+        </p:style>
+      </p:cxnSp>
+      <p:cxnSp>
+        <p:nvCxnSpPr>
+          <p:cNvPr id="68" name="Elbow Connector 67">
+            <a:extLst>
+              <a:ext uri="{FF2B5EF4-FFF2-40B4-BE49-F238E27FC236}">
+                <a16:creationId xmlns:a16="http://schemas.microsoft.com/office/drawing/2014/main" id="{79977457-4FEA-780A-9780-C406A199678A}"/>
+              </a:ext>
+            </a:extLst>
+          </p:cNvPr>
+          <p:cNvCxnSpPr>
+            <a:cxnSpLocks/>
+            <a:stCxn id="4" idx="3"/>
+            <a:endCxn id="45" idx="1"/>
+          </p:cNvCxnSpPr>
+          <p:nvPr/>
+        </p:nvCxnSpPr>
+        <p:spPr>
+          <a:xfrm>
+            <a:off x="2040446" y="4586174"/>
+            <a:ext cx="801472" cy="425820"/>
+          </a:xfrm>
+          <a:prstGeom prst="bentConnector3">
+            <a:avLst/>
+          </a:prstGeom>
+          <a:ln>
+            <a:tailEnd type="triangle"/>
+          </a:ln>
+        </p:spPr>
+        <p:style>
+          <a:lnRef idx="1">
+            <a:schemeClr val="dk1"/>
+          </a:lnRef>
+          <a:fillRef idx="0">
+            <a:schemeClr val="dk1"/>
+          </a:fillRef>
+          <a:effectRef idx="0">
+            <a:schemeClr val="dk1"/>
+          </a:effectRef>
+          <a:fontRef idx="minor">
+            <a:schemeClr val="tx1"/>
+          </a:fontRef>
+        </p:style>
+      </p:cxnSp>
+      <p:cxnSp>
+        <p:nvCxnSpPr>
+          <p:cNvPr id="70" name="Elbow Connector 69">
+            <a:extLst>
+              <a:ext uri="{FF2B5EF4-FFF2-40B4-BE49-F238E27FC236}">
+                <a16:creationId xmlns:a16="http://schemas.microsoft.com/office/drawing/2014/main" id="{4EC4FDA6-59CF-ACE2-0218-6B255D0647A3}"/>
+              </a:ext>
+            </a:extLst>
+          </p:cNvPr>
+          <p:cNvCxnSpPr>
+            <a:cxnSpLocks/>
+            <a:stCxn id="47" idx="3"/>
+            <a:endCxn id="45" idx="1"/>
+          </p:cNvCxnSpPr>
+          <p:nvPr/>
+        </p:nvCxnSpPr>
+        <p:spPr>
+          <a:xfrm flipV="1">
+            <a:off x="2041451" y="5011994"/>
+            <a:ext cx="800467" cy="991035"/>
+          </a:xfrm>
+          <a:prstGeom prst="bentConnector3">
+            <a:avLst/>
+          </a:prstGeom>
+          <a:ln>
+            <a:tailEnd type="triangle"/>
+          </a:ln>
+        </p:spPr>
+        <p:style>
+          <a:lnRef idx="1">
+            <a:schemeClr val="dk1"/>
+          </a:lnRef>
+          <a:fillRef idx="0">
+            <a:schemeClr val="dk1"/>
+          </a:fillRef>
+          <a:effectRef idx="0">
+            <a:schemeClr val="dk1"/>
+          </a:effectRef>
+          <a:fontRef idx="minor">
+            <a:schemeClr val="tx1"/>
+          </a:fontRef>
+        </p:style>
+      </p:cxnSp>
     </p:spTree>
     <p:extLst>
       <p:ext uri="{BB962C8B-B14F-4D97-AF65-F5344CB8AC3E}">
-        <p14:creationId xmlns:p14="http://schemas.microsoft.com/office/powerpoint/2010/main" val="1228097628"/>
+        <p14:creationId xmlns:p14="http://schemas.microsoft.com/office/powerpoint/2010/main" val="1261115438"/>
       </p:ext>
     </p:extLst>
   </p:cSld>
@@ -4499,35 +6995,70 @@
           <a:bodyPr/>
           <a:lstStyle/>
           <a:p>
-            <a:endParaRPr lang="en-US"/>
-          </a:p>
-        </p:txBody>
-      </p:sp>
-      <p:sp>
-        <p:nvSpPr>
-          <p:cNvPr id="3" name="Content Placeholder 2">
-            <a:extLst>
-              <a:ext uri="{FF2B5EF4-FFF2-40B4-BE49-F238E27FC236}">
-                <a16:creationId xmlns:a16="http://schemas.microsoft.com/office/drawing/2014/main" id="{226257C5-93B5-4EEF-2D6B-03CAF43F6A4A}"/>
-              </a:ext>
-            </a:extLst>
-          </p:cNvPr>
-          <p:cNvSpPr>
-            <a:spLocks noGrp="1"/>
-          </p:cNvSpPr>
+            <a:r>
+              <a:rPr lang="en-US" dirty="0"/>
+              <a:t>Covariates Selection</a:t>
+            </a:r>
+          </a:p>
+        </p:txBody>
+      </p:sp>
+      <p:pic>
+        <p:nvPicPr>
+          <p:cNvPr id="5" name="Content Placeholder 4">
+            <a:extLst>
+              <a:ext uri="{FF2B5EF4-FFF2-40B4-BE49-F238E27FC236}">
+                <a16:creationId xmlns:a16="http://schemas.microsoft.com/office/drawing/2014/main" id="{5125170E-9011-D470-4F3B-27AD48A9A0BE}"/>
+              </a:ext>
+            </a:extLst>
+          </p:cNvPr>
+          <p:cNvPicPr>
+            <a:picLocks noGrp="1" noChangeAspect="1"/>
+          </p:cNvPicPr>
           <p:nvPr>
             <p:ph idx="1"/>
           </p:nvPr>
-        </p:nvSpPr>
-        <p:spPr/>
-        <p:txBody>
-          <a:bodyPr/>
-          <a:lstStyle/>
-          <a:p>
-            <a:endParaRPr lang="en-US"/>
-          </a:p>
-        </p:txBody>
-      </p:sp>
+        </p:nvPicPr>
+        <p:blipFill rotWithShape="1">
+          <a:blip r:embed="rId3"/>
+          <a:srcRect l="33305" t="8829" r="13662" b="6864"/>
+          <a:stretch/>
+        </p:blipFill>
+        <p:spPr>
+          <a:xfrm>
+            <a:off x="838200" y="1465687"/>
+            <a:ext cx="4027716" cy="5027188"/>
+          </a:xfrm>
+        </p:spPr>
+      </p:pic>
+      <p:pic>
+        <p:nvPicPr>
+          <p:cNvPr id="9" name="Picture 8">
+            <a:extLst>
+              <a:ext uri="{FF2B5EF4-FFF2-40B4-BE49-F238E27FC236}">
+                <a16:creationId xmlns:a16="http://schemas.microsoft.com/office/drawing/2014/main" id="{51AC8637-BF3D-10B4-477D-16BF793C6ED4}"/>
+              </a:ext>
+            </a:extLst>
+          </p:cNvPr>
+          <p:cNvPicPr>
+            <a:picLocks noChangeAspect="1"/>
+          </p:cNvPicPr>
+          <p:nvPr/>
+        </p:nvPicPr>
+        <p:blipFill rotWithShape="1">
+          <a:blip r:embed="rId4"/>
+          <a:srcRect l="52051" t="9296" r="15814" b="7181"/>
+          <a:stretch/>
+        </p:blipFill>
+        <p:spPr>
+          <a:xfrm>
+            <a:off x="8619067" y="288756"/>
+            <a:ext cx="3141133" cy="6410043"/>
+          </a:xfrm>
+          <a:prstGeom prst="rect">
+            <a:avLst/>
+          </a:prstGeom>
+        </p:spPr>
+      </p:pic>
     </p:spTree>
     <p:extLst>
       <p:ext uri="{BB962C8B-B14F-4D97-AF65-F5344CB8AC3E}">
@@ -4834,4 +7365,299 @@
     </a:ext>
   </a:extLst>
 </a:theme>
+</file>
+
+<file path=ppt/theme/theme2.xml><?xml version="1.0" encoding="utf-8"?>
+<a:theme xmlns:a="http://schemas.openxmlformats.org/drawingml/2006/main" name="Office Theme">
+  <a:themeElements>
+    <a:clrScheme name="Office">
+      <a:dk1>
+        <a:sysClr val="windowText" lastClr="000000"/>
+      </a:dk1>
+      <a:lt1>
+        <a:sysClr val="window" lastClr="FFFFFF"/>
+      </a:lt1>
+      <a:dk2>
+        <a:srgbClr val="44546A"/>
+      </a:dk2>
+      <a:lt2>
+        <a:srgbClr val="E7E6E6"/>
+      </a:lt2>
+      <a:accent1>
+        <a:srgbClr val="4472C4"/>
+      </a:accent1>
+      <a:accent2>
+        <a:srgbClr val="ED7D31"/>
+      </a:accent2>
+      <a:accent3>
+        <a:srgbClr val="A5A5A5"/>
+      </a:accent3>
+      <a:accent4>
+        <a:srgbClr val="FFC000"/>
+      </a:accent4>
+      <a:accent5>
+        <a:srgbClr val="5B9BD5"/>
+      </a:accent5>
+      <a:accent6>
+        <a:srgbClr val="70AD47"/>
+      </a:accent6>
+      <a:hlink>
+        <a:srgbClr val="0563C1"/>
+      </a:hlink>
+      <a:folHlink>
+        <a:srgbClr val="954F72"/>
+      </a:folHlink>
+    </a:clrScheme>
+    <a:fontScheme name="Office">
+      <a:majorFont>
+        <a:latin typeface="Calibri Light" panose="020F0302020204030204"/>
+        <a:ea typeface=""/>
+        <a:cs typeface=""/>
+        <a:font script="Jpan" typeface="游ゴシック Light"/>
+        <a:font script="Hang" typeface="맑은 고딕"/>
+        <a:font script="Hans" typeface="等线 Light"/>
+        <a:font script="Hant" typeface="新細明體"/>
+        <a:font script="Arab" typeface="Times New Roman"/>
+        <a:font script="Hebr" typeface="Times New Roman"/>
+        <a:font script="Thai" typeface="Angsana New"/>
+        <a:font script="Ethi" typeface="Nyala"/>
+        <a:font script="Beng" typeface="Vrinda"/>
+        <a:font script="Gujr" typeface="Shruti"/>
+        <a:font script="Khmr" typeface="MoolBoran"/>
+        <a:font script="Knda" typeface="Tunga"/>
+        <a:font script="Guru" typeface="Raavi"/>
+        <a:font script="Cans" typeface="Euphemia"/>
+        <a:font script="Cher" typeface="Plantagenet Cherokee"/>
+        <a:font script="Yiii" typeface="Microsoft Yi Baiti"/>
+        <a:font script="Tibt" typeface="Microsoft Himalaya"/>
+        <a:font script="Thaa" typeface="MV Boli"/>
+        <a:font script="Deva" typeface="Mangal"/>
+        <a:font script="Telu" typeface="Gautami"/>
+        <a:font script="Taml" typeface="Latha"/>
+        <a:font script="Syrc" typeface="Estrangelo Edessa"/>
+        <a:font script="Orya" typeface="Kalinga"/>
+        <a:font script="Mlym" typeface="Kartika"/>
+        <a:font script="Laoo" typeface="DokChampa"/>
+        <a:font script="Sinh" typeface="Iskoola Pota"/>
+        <a:font script="Mong" typeface="Mongolian Baiti"/>
+        <a:font script="Viet" typeface="Times New Roman"/>
+        <a:font script="Uigh" typeface="Microsoft Uighur"/>
+        <a:font script="Geor" typeface="Sylfaen"/>
+        <a:font script="Armn" typeface="Arial"/>
+        <a:font script="Bugi" typeface="Leelawadee UI"/>
+        <a:font script="Bopo" typeface="Microsoft JhengHei"/>
+        <a:font script="Java" typeface="Javanese Text"/>
+        <a:font script="Lisu" typeface="Segoe UI"/>
+        <a:font script="Mymr" typeface="Myanmar Text"/>
+        <a:font script="Nkoo" typeface="Ebrima"/>
+        <a:font script="Olck" typeface="Nirmala UI"/>
+        <a:font script="Osma" typeface="Ebrima"/>
+        <a:font script="Phag" typeface="Phagspa"/>
+        <a:font script="Syrn" typeface="Estrangelo Edessa"/>
+        <a:font script="Syrj" typeface="Estrangelo Edessa"/>
+        <a:font script="Syre" typeface="Estrangelo Edessa"/>
+        <a:font script="Sora" typeface="Nirmala UI"/>
+        <a:font script="Tale" typeface="Microsoft Tai Le"/>
+        <a:font script="Talu" typeface="Microsoft New Tai Lue"/>
+        <a:font script="Tfng" typeface="Ebrima"/>
+      </a:majorFont>
+      <a:minorFont>
+        <a:latin typeface="Calibri" panose="020F0502020204030204"/>
+        <a:ea typeface=""/>
+        <a:cs typeface=""/>
+        <a:font script="Jpan" typeface="游ゴシック"/>
+        <a:font script="Hang" typeface="맑은 고딕"/>
+        <a:font script="Hans" typeface="等线"/>
+        <a:font script="Hant" typeface="新細明體"/>
+        <a:font script="Arab" typeface="Arial"/>
+        <a:font script="Hebr" typeface="Arial"/>
+        <a:font script="Thai" typeface="Cordia New"/>
+        <a:font script="Ethi" typeface="Nyala"/>
+        <a:font script="Beng" typeface="Vrinda"/>
+        <a:font script="Gujr" typeface="Shruti"/>
+        <a:font script="Khmr" typeface="DaunPenh"/>
+        <a:font script="Knda" typeface="Tunga"/>
+        <a:font script="Guru" typeface="Raavi"/>
+        <a:font script="Cans" typeface="Euphemia"/>
+        <a:font script="Cher" typeface="Plantagenet Cherokee"/>
+        <a:font script="Yiii" typeface="Microsoft Yi Baiti"/>
+        <a:font script="Tibt" typeface="Microsoft Himalaya"/>
+        <a:font script="Thaa" typeface="MV Boli"/>
+        <a:font script="Deva" typeface="Mangal"/>
+        <a:font script="Telu" typeface="Gautami"/>
+        <a:font script="Taml" typeface="Latha"/>
+        <a:font script="Syrc" typeface="Estrangelo Edessa"/>
+        <a:font script="Orya" typeface="Kalinga"/>
+        <a:font script="Mlym" typeface="Kartika"/>
+        <a:font script="Laoo" typeface="DokChampa"/>
+        <a:font script="Sinh" typeface="Iskoola Pota"/>
+        <a:font script="Mong" typeface="Mongolian Baiti"/>
+        <a:font script="Viet" typeface="Arial"/>
+        <a:font script="Uigh" typeface="Microsoft Uighur"/>
+        <a:font script="Geor" typeface="Sylfaen"/>
+        <a:font script="Armn" typeface="Arial"/>
+        <a:font script="Bugi" typeface="Leelawadee UI"/>
+        <a:font script="Bopo" typeface="Microsoft JhengHei"/>
+        <a:font script="Java" typeface="Javanese Text"/>
+        <a:font script="Lisu" typeface="Segoe UI"/>
+        <a:font script="Mymr" typeface="Myanmar Text"/>
+        <a:font script="Nkoo" typeface="Ebrima"/>
+        <a:font script="Olck" typeface="Nirmala UI"/>
+        <a:font script="Osma" typeface="Ebrima"/>
+        <a:font script="Phag" typeface="Phagspa"/>
+        <a:font script="Syrn" typeface="Estrangelo Edessa"/>
+        <a:font script="Syrj" typeface="Estrangelo Edessa"/>
+        <a:font script="Syre" typeface="Estrangelo Edessa"/>
+        <a:font script="Sora" typeface="Nirmala UI"/>
+        <a:font script="Tale" typeface="Microsoft Tai Le"/>
+        <a:font script="Talu" typeface="Microsoft New Tai Lue"/>
+        <a:font script="Tfng" typeface="Ebrima"/>
+      </a:minorFont>
+    </a:fontScheme>
+    <a:fmtScheme name="Office">
+      <a:fillStyleLst>
+        <a:solidFill>
+          <a:schemeClr val="phClr"/>
+        </a:solidFill>
+        <a:gradFill rotWithShape="1">
+          <a:gsLst>
+            <a:gs pos="0">
+              <a:schemeClr val="phClr">
+                <a:lumMod val="110000"/>
+                <a:satMod val="105000"/>
+                <a:tint val="67000"/>
+              </a:schemeClr>
+            </a:gs>
+            <a:gs pos="50000">
+              <a:schemeClr val="phClr">
+                <a:lumMod val="105000"/>
+                <a:satMod val="103000"/>
+                <a:tint val="73000"/>
+              </a:schemeClr>
+            </a:gs>
+            <a:gs pos="100000">
+              <a:schemeClr val="phClr">
+                <a:lumMod val="105000"/>
+                <a:satMod val="109000"/>
+                <a:tint val="81000"/>
+              </a:schemeClr>
+            </a:gs>
+          </a:gsLst>
+          <a:lin ang="5400000" scaled="0"/>
+        </a:gradFill>
+        <a:gradFill rotWithShape="1">
+          <a:gsLst>
+            <a:gs pos="0">
+              <a:schemeClr val="phClr">
+                <a:satMod val="103000"/>
+                <a:lumMod val="102000"/>
+                <a:tint val="94000"/>
+              </a:schemeClr>
+            </a:gs>
+            <a:gs pos="50000">
+              <a:schemeClr val="phClr">
+                <a:satMod val="110000"/>
+                <a:lumMod val="100000"/>
+                <a:shade val="100000"/>
+              </a:schemeClr>
+            </a:gs>
+            <a:gs pos="100000">
+              <a:schemeClr val="phClr">
+                <a:lumMod val="99000"/>
+                <a:satMod val="120000"/>
+                <a:shade val="78000"/>
+              </a:schemeClr>
+            </a:gs>
+          </a:gsLst>
+          <a:lin ang="5400000" scaled="0"/>
+        </a:gradFill>
+      </a:fillStyleLst>
+      <a:lnStyleLst>
+        <a:ln w="6350" cap="flat" cmpd="sng" algn="ctr">
+          <a:solidFill>
+            <a:schemeClr val="phClr"/>
+          </a:solidFill>
+          <a:prstDash val="solid"/>
+          <a:miter lim="800000"/>
+        </a:ln>
+        <a:ln w="12700" cap="flat" cmpd="sng" algn="ctr">
+          <a:solidFill>
+            <a:schemeClr val="phClr"/>
+          </a:solidFill>
+          <a:prstDash val="solid"/>
+          <a:miter lim="800000"/>
+        </a:ln>
+        <a:ln w="19050" cap="flat" cmpd="sng" algn="ctr">
+          <a:solidFill>
+            <a:schemeClr val="phClr"/>
+          </a:solidFill>
+          <a:prstDash val="solid"/>
+          <a:miter lim="800000"/>
+        </a:ln>
+      </a:lnStyleLst>
+      <a:effectStyleLst>
+        <a:effectStyle>
+          <a:effectLst/>
+        </a:effectStyle>
+        <a:effectStyle>
+          <a:effectLst/>
+        </a:effectStyle>
+        <a:effectStyle>
+          <a:effectLst>
+            <a:outerShdw blurRad="57150" dist="19050" dir="5400000" algn="ctr" rotWithShape="0">
+              <a:srgbClr val="000000">
+                <a:alpha val="63000"/>
+              </a:srgbClr>
+            </a:outerShdw>
+          </a:effectLst>
+        </a:effectStyle>
+      </a:effectStyleLst>
+      <a:bgFillStyleLst>
+        <a:solidFill>
+          <a:schemeClr val="phClr"/>
+        </a:solidFill>
+        <a:solidFill>
+          <a:schemeClr val="phClr">
+            <a:tint val="95000"/>
+            <a:satMod val="170000"/>
+          </a:schemeClr>
+        </a:solidFill>
+        <a:gradFill rotWithShape="1">
+          <a:gsLst>
+            <a:gs pos="0">
+              <a:schemeClr val="phClr">
+                <a:tint val="93000"/>
+                <a:satMod val="150000"/>
+                <a:shade val="98000"/>
+                <a:lumMod val="102000"/>
+              </a:schemeClr>
+            </a:gs>
+            <a:gs pos="50000">
+              <a:schemeClr val="phClr">
+                <a:tint val="98000"/>
+                <a:satMod val="130000"/>
+                <a:shade val="90000"/>
+                <a:lumMod val="103000"/>
+              </a:schemeClr>
+            </a:gs>
+            <a:gs pos="100000">
+              <a:schemeClr val="phClr">
+                <a:shade val="63000"/>
+                <a:satMod val="120000"/>
+              </a:schemeClr>
+            </a:gs>
+          </a:gsLst>
+          <a:lin ang="5400000" scaled="0"/>
+        </a:gradFill>
+      </a:bgFillStyleLst>
+    </a:fmtScheme>
+  </a:themeElements>
+  <a:objectDefaults/>
+  <a:extraClrSchemeLst/>
+  <a:extLst>
+    <a:ext uri="{05A4C25C-085E-4340-85A3-A5531E510DB2}">
+      <thm15:themeFamily xmlns:thm15="http://schemas.microsoft.com/office/thememl/2012/main" name="Office Theme" id="{62F939B6-93AF-4DB8-9C6B-D6C7DFDC589F}" vid="{4A3C46E8-61CC-4603-A589-7422A47A8E4A}"/>
+    </a:ext>
+  </a:extLst>
+</a:theme>
 </file>
</xml_diff>